<commit_message>
continue to modify functions
</commit_message>
<xml_diff>
--- a/new_ng/polished-fribble.pptx
+++ b/new_ng/polished-fribble.pptx
@@ -5,14 +5,15 @@
     <p:sldMasterId id="2147483648" r:id="rId1"/>
   </p:sldMasterIdLst>
   <p:notesMasterIdLst>
-    <p:notesMasterId r:id="rId4"/>
+    <p:notesMasterId r:id="rId5"/>
   </p:notesMasterIdLst>
   <p:handoutMasterIdLst>
-    <p:handoutMasterId r:id="rId5"/>
+    <p:handoutMasterId r:id="rId6"/>
   </p:handoutMasterIdLst>
   <p:sldIdLst>
     <p:sldId id="256" r:id="rId2"/>
     <p:sldId id="257" r:id="rId3"/>
+    <p:sldId id="258" r:id="rId4"/>
   </p:sldIdLst>
   <p:sldSz cx="12192000" cy="6858000"/>
   <p:notesSz cx="7559675" cy="10691813"/>
@@ -111,6 +112,11 @@
       </a:defRPr>
     </a:lvl9pPr>
   </p:defaultTextStyle>
+  <p:extLst>
+    <p:ext uri="{EFAFB233-063F-42B5-8137-9DF3F51BA10A}">
+      <p15:sldGuideLst xmlns:p15="http://schemas.microsoft.com/office/powerpoint/2012/main"/>
+    </p:ext>
+  </p:extLst>
 </p:presentation>
 </file>
 
@@ -7620,6 +7626,2855 @@
         </p:txBody>
       </p:sp>
     </p:spTree>
+  </p:cSld>
+  <p:clrMapOvr>
+    <a:masterClrMapping/>
+  </p:clrMapOvr>
+</p:sld>
+</file>
+
+<file path=ppt/slides/slide3.xml><?xml version="1.0" encoding="utf-8"?>
+<p:sld xmlns:a="http://schemas.openxmlformats.org/drawingml/2006/main" xmlns:r="http://schemas.openxmlformats.org/officeDocument/2006/relationships" xmlns:p="http://schemas.openxmlformats.org/presentationml/2006/main">
+  <p:cSld>
+    <p:spTree>
+      <p:nvGrpSpPr>
+        <p:cNvPr id="1" name=""/>
+        <p:cNvGrpSpPr/>
+        <p:nvPr/>
+      </p:nvGrpSpPr>
+      <p:grpSpPr>
+        <a:xfrm>
+          <a:off x="0" y="0"/>
+          <a:ext cx="0" cy="0"/>
+          <a:chOff x="0" y="0"/>
+          <a:chExt cx="0" cy="0"/>
+        </a:xfrm>
+      </p:grpSpPr>
+      <p:sp>
+        <p:nvSpPr>
+          <p:cNvPr id="2" name="Rectangle 3">
+            <a:extLst>
+              <a:ext uri="{FF2B5EF4-FFF2-40B4-BE49-F238E27FC236}">
+                <a16:creationId xmlns:a16="http://schemas.microsoft.com/office/drawing/2014/main" id="{439ED135-7C63-4B3C-B05D-7F0AB4FE41DF}"/>
+              </a:ext>
+            </a:extLst>
+          </p:cNvPr>
+          <p:cNvSpPr/>
+          <p:nvPr/>
+        </p:nvSpPr>
+        <p:spPr>
+          <a:xfrm>
+            <a:off x="2803239" y="1115997"/>
+            <a:ext cx="2576157" cy="1226877"/>
+          </a:xfrm>
+          <a:prstGeom prst="rect">
+            <a:avLst/>
+          </a:prstGeom>
+          <a:solidFill>
+            <a:srgbClr val="FFFFFF"/>
+          </a:solidFill>
+          <a:ln w="12600" cap="flat">
+            <a:solidFill>
+              <a:srgbClr val="000000"/>
+            </a:solidFill>
+            <a:prstDash val="solid"/>
+            <a:miter/>
+          </a:ln>
+        </p:spPr>
+        <p:txBody>
+          <a:bodyPr vert="horz" wrap="square" lIns="91440" tIns="45720" rIns="91440" bIns="45720" anchor="ctr" anchorCtr="1" compatLnSpc="0">
+            <a:noAutofit/>
+          </a:bodyPr>
+          <a:lstStyle/>
+          <a:p>
+            <a:pPr marL="0" marR="0" lvl="0" indent="0" algn="l" defTabSz="914400" rtl="0" fontAlgn="auto" hangingPunct="0">
+              <a:lnSpc>
+                <a:spcPct val="100000"/>
+              </a:lnSpc>
+              <a:spcBef>
+                <a:spcPts val="0"/>
+              </a:spcBef>
+              <a:spcAft>
+                <a:spcPts val="0"/>
+              </a:spcAft>
+              <a:buNone/>
+              <a:tabLst/>
+              <a:defRPr sz="1800" b="0" i="0" u="none" strike="noStrike" kern="0" cap="none" spc="0" baseline="0">
+                <a:solidFill>
+                  <a:srgbClr val="000000"/>
+                </a:solidFill>
+                <a:uFillTx/>
+              </a:defRPr>
+            </a:pPr>
+            <a:endParaRPr lang="en-GB" sz="1800" b="0" i="0" u="none" strike="noStrike" kern="1200" cap="none" spc="0" baseline="0">
+              <a:solidFill>
+                <a:srgbClr val="000000"/>
+              </a:solidFill>
+              <a:uFillTx/>
+              <a:latin typeface="Arial" pitchFamily="18"/>
+              <a:ea typeface="Microsoft YaHei" pitchFamily="2"/>
+              <a:cs typeface="Lucida Sans" pitchFamily="2"/>
+            </a:endParaRPr>
+          </a:p>
+        </p:txBody>
+      </p:sp>
+      <p:sp>
+        <p:nvSpPr>
+          <p:cNvPr id="3" name="TextBox 4">
+            <a:extLst>
+              <a:ext uri="{FF2B5EF4-FFF2-40B4-BE49-F238E27FC236}">
+                <a16:creationId xmlns:a16="http://schemas.microsoft.com/office/drawing/2014/main" id="{BFB8BA1D-5585-4569-BA4A-85DFD01D3520}"/>
+              </a:ext>
+            </a:extLst>
+          </p:cNvPr>
+          <p:cNvSpPr txBox="1"/>
+          <p:nvPr/>
+        </p:nvSpPr>
+        <p:spPr>
+          <a:xfrm>
+            <a:off x="2803239" y="1115997"/>
+            <a:ext cx="2580189" cy="280208"/>
+          </a:xfrm>
+          <a:prstGeom prst="rect">
+            <a:avLst/>
+          </a:prstGeom>
+          <a:noFill/>
+          <a:ln cap="flat">
+            <a:noFill/>
+          </a:ln>
+        </p:spPr>
+        <p:txBody>
+          <a:bodyPr vert="horz" wrap="none" lIns="91440" tIns="45720" rIns="91440" bIns="45720" anchor="t" anchorCtr="0" compatLnSpc="0">
+            <a:spAutoFit/>
+          </a:bodyPr>
+          <a:lstStyle/>
+          <a:p>
+            <a:pPr marL="0" marR="0" lvl="0" indent="0" algn="l" defTabSz="914400" rtl="0" fontAlgn="auto" hangingPunct="1">
+              <a:lnSpc>
+                <a:spcPct val="100000"/>
+              </a:lnSpc>
+              <a:spcBef>
+                <a:spcPts val="0"/>
+              </a:spcBef>
+              <a:spcAft>
+                <a:spcPts val="0"/>
+              </a:spcAft>
+              <a:buNone/>
+              <a:tabLst/>
+              <a:defRPr sz="1800" b="0" i="0" u="none" strike="noStrike" kern="0" cap="none" spc="0" baseline="0">
+                <a:solidFill>
+                  <a:srgbClr val="000000"/>
+                </a:solidFill>
+                <a:uFillTx/>
+              </a:defRPr>
+            </a:pPr>
+            <a:r>
+              <a:rPr lang="en-GB" sz="1200" b="1" i="0" u="none" strike="noStrike" kern="1200" cap="none" spc="0" baseline="0">
+                <a:solidFill>
+                  <a:srgbClr val="000000"/>
+                </a:solidFill>
+                <a:uFillTx/>
+                <a:latin typeface="Calibri" pitchFamily="18"/>
+                <a:ea typeface="Microsoft YaHei" pitchFamily="2"/>
+                <a:cs typeface="Lucida Sans" pitchFamily="2"/>
+              </a:rPr>
+              <a:t>name</a:t>
+            </a:r>
+            <a:r>
+              <a:rPr lang="en-GB" sz="1200" b="0" i="0" u="none" strike="noStrike" kern="1200" cap="none" spc="0" baseline="0">
+                <a:solidFill>
+                  <a:srgbClr val="000000"/>
+                </a:solidFill>
+                <a:uFillTx/>
+                <a:latin typeface="Calibri" pitchFamily="18"/>
+                <a:ea typeface="Microsoft YaHei" pitchFamily="2"/>
+                <a:cs typeface="Lucida Sans" pitchFamily="2"/>
+              </a:rPr>
+              <a:t> | room | password | permission</a:t>
+            </a:r>
+          </a:p>
+        </p:txBody>
+      </p:sp>
+      <p:cxnSp>
+        <p:nvCxnSpPr>
+          <p:cNvPr id="4" name="Straight Connector 7">
+            <a:extLst>
+              <a:ext uri="{FF2B5EF4-FFF2-40B4-BE49-F238E27FC236}">
+                <a16:creationId xmlns:a16="http://schemas.microsoft.com/office/drawing/2014/main" id="{67719560-8FE5-4A67-8EAC-7E4EBE99EF2B}"/>
+              </a:ext>
+            </a:extLst>
+          </p:cNvPr>
+          <p:cNvCxnSpPr/>
+          <p:nvPr/>
+        </p:nvCxnSpPr>
+        <p:spPr>
+          <a:xfrm>
+            <a:off x="2803239" y="1393198"/>
+            <a:ext cx="2557083" cy="0"/>
+          </a:xfrm>
+          <a:prstGeom prst="straightConnector1">
+            <a:avLst/>
+          </a:prstGeom>
+          <a:noFill/>
+          <a:ln w="6483" cap="flat">
+            <a:solidFill>
+              <a:srgbClr val="000000"/>
+            </a:solidFill>
+            <a:prstDash val="solid"/>
+            <a:miter/>
+          </a:ln>
+        </p:spPr>
+      </p:cxnSp>
+      <p:sp>
+        <p:nvSpPr>
+          <p:cNvPr id="5" name="Rectangle 8">
+            <a:extLst>
+              <a:ext uri="{FF2B5EF4-FFF2-40B4-BE49-F238E27FC236}">
+                <a16:creationId xmlns:a16="http://schemas.microsoft.com/office/drawing/2014/main" id="{21FFFDF2-65E6-4772-A97C-93BED2918124}"/>
+              </a:ext>
+            </a:extLst>
+          </p:cNvPr>
+          <p:cNvSpPr/>
+          <p:nvPr/>
+        </p:nvSpPr>
+        <p:spPr>
+          <a:xfrm>
+            <a:off x="2776237" y="3125876"/>
+            <a:ext cx="1452963" cy="1226877"/>
+          </a:xfrm>
+          <a:prstGeom prst="rect">
+            <a:avLst/>
+          </a:prstGeom>
+          <a:solidFill>
+            <a:srgbClr val="FFFFFF"/>
+          </a:solidFill>
+          <a:ln w="12600" cap="flat">
+            <a:solidFill>
+              <a:srgbClr val="000000"/>
+            </a:solidFill>
+            <a:prstDash val="solid"/>
+            <a:miter/>
+          </a:ln>
+        </p:spPr>
+        <p:txBody>
+          <a:bodyPr vert="horz" wrap="square" lIns="91440" tIns="45720" rIns="91440" bIns="45720" anchor="ctr" anchorCtr="1" compatLnSpc="0">
+            <a:noAutofit/>
+          </a:bodyPr>
+          <a:lstStyle/>
+          <a:p>
+            <a:pPr marL="0" marR="0" lvl="0" indent="0" algn="l" defTabSz="914400" rtl="0" fontAlgn="auto" hangingPunct="0">
+              <a:lnSpc>
+                <a:spcPct val="100000"/>
+              </a:lnSpc>
+              <a:spcBef>
+                <a:spcPts val="0"/>
+              </a:spcBef>
+              <a:spcAft>
+                <a:spcPts val="0"/>
+              </a:spcAft>
+              <a:buNone/>
+              <a:tabLst/>
+              <a:defRPr sz="1800" b="0" i="0" u="none" strike="noStrike" kern="0" cap="none" spc="0" baseline="0">
+                <a:solidFill>
+                  <a:srgbClr val="000000"/>
+                </a:solidFill>
+                <a:uFillTx/>
+              </a:defRPr>
+            </a:pPr>
+            <a:endParaRPr lang="en-GB" sz="1800" b="0" i="0" u="none" strike="noStrike" kern="1200" cap="none" spc="0" baseline="0">
+              <a:solidFill>
+                <a:srgbClr val="000000"/>
+              </a:solidFill>
+              <a:uFillTx/>
+              <a:latin typeface="Arial" pitchFamily="18"/>
+              <a:ea typeface="Microsoft YaHei" pitchFamily="2"/>
+              <a:cs typeface="Lucida Sans" pitchFamily="2"/>
+            </a:endParaRPr>
+          </a:p>
+        </p:txBody>
+      </p:sp>
+      <p:sp>
+        <p:nvSpPr>
+          <p:cNvPr id="6" name="TextBox 9">
+            <a:extLst>
+              <a:ext uri="{FF2B5EF4-FFF2-40B4-BE49-F238E27FC236}">
+                <a16:creationId xmlns:a16="http://schemas.microsoft.com/office/drawing/2014/main" id="{2D29FE3E-B839-4702-8811-05720FF9BCD3}"/>
+              </a:ext>
+            </a:extLst>
+          </p:cNvPr>
+          <p:cNvSpPr txBox="1"/>
+          <p:nvPr/>
+        </p:nvSpPr>
+        <p:spPr>
+          <a:xfrm>
+            <a:off x="2776237" y="3125876"/>
+            <a:ext cx="1401665" cy="280208"/>
+          </a:xfrm>
+          <a:prstGeom prst="rect">
+            <a:avLst/>
+          </a:prstGeom>
+          <a:noFill/>
+          <a:ln cap="flat">
+            <a:noFill/>
+          </a:ln>
+        </p:spPr>
+        <p:txBody>
+          <a:bodyPr vert="horz" wrap="none" lIns="91440" tIns="45720" rIns="91440" bIns="45720" anchor="t" anchorCtr="0" compatLnSpc="0">
+            <a:spAutoFit/>
+          </a:bodyPr>
+          <a:lstStyle/>
+          <a:p>
+            <a:pPr marL="0" marR="0" lvl="0" indent="0" algn="l" defTabSz="914400" rtl="0" fontAlgn="auto" hangingPunct="1">
+              <a:lnSpc>
+                <a:spcPct val="100000"/>
+              </a:lnSpc>
+              <a:spcBef>
+                <a:spcPts val="0"/>
+              </a:spcBef>
+              <a:spcAft>
+                <a:spcPts val="0"/>
+              </a:spcAft>
+              <a:buNone/>
+              <a:tabLst/>
+              <a:defRPr sz="1800" b="0" i="0" u="none" strike="noStrike" kern="0" cap="none" spc="0" baseline="0">
+                <a:solidFill>
+                  <a:srgbClr val="000000"/>
+                </a:solidFill>
+                <a:uFillTx/>
+              </a:defRPr>
+            </a:pPr>
+            <a:r>
+              <a:rPr lang="en-GB" sz="1200" b="1" i="0" u="none" strike="noStrike" kern="1200" cap="none" spc="0" baseline="0">
+                <a:solidFill>
+                  <a:srgbClr val="000000"/>
+                </a:solidFill>
+                <a:uFillTx/>
+                <a:latin typeface="Calibri" pitchFamily="18"/>
+                <a:ea typeface="Microsoft YaHei" pitchFamily="2"/>
+                <a:cs typeface="Lucida Sans" pitchFamily="2"/>
+              </a:rPr>
+              <a:t>booking no</a:t>
+            </a:r>
+            <a:r>
+              <a:rPr lang="en-GB" sz="1200" b="0" i="0" u="none" strike="noStrike" kern="1200" cap="none" spc="0" baseline="0">
+                <a:solidFill>
+                  <a:srgbClr val="000000"/>
+                </a:solidFill>
+                <a:uFillTx/>
+                <a:latin typeface="Calibri" pitchFamily="18"/>
+                <a:ea typeface="Microsoft YaHei" pitchFamily="2"/>
+                <a:cs typeface="Lucida Sans" pitchFamily="2"/>
+              </a:rPr>
+              <a:t> | </a:t>
+            </a:r>
+            <a:r>
+              <a:rPr lang="en-GB" sz="1200" b="1" i="0" u="none" strike="noStrike" kern="1200" cap="none" spc="0" baseline="0">
+                <a:solidFill>
+                  <a:srgbClr val="000000"/>
+                </a:solidFill>
+                <a:uFillTx/>
+                <a:latin typeface="Calibri" pitchFamily="18"/>
+                <a:ea typeface="Microsoft YaHei" pitchFamily="2"/>
+                <a:cs typeface="Lucida Sans" pitchFamily="2"/>
+              </a:rPr>
+              <a:t>name</a:t>
+            </a:r>
+          </a:p>
+        </p:txBody>
+      </p:sp>
+      <p:cxnSp>
+        <p:nvCxnSpPr>
+          <p:cNvPr id="7" name="Straight Connector 10">
+            <a:extLst>
+              <a:ext uri="{FF2B5EF4-FFF2-40B4-BE49-F238E27FC236}">
+                <a16:creationId xmlns:a16="http://schemas.microsoft.com/office/drawing/2014/main" id="{752B4A4F-985A-4A8C-96A7-E65817456FF5}"/>
+              </a:ext>
+            </a:extLst>
+          </p:cNvPr>
+          <p:cNvCxnSpPr/>
+          <p:nvPr/>
+        </p:nvCxnSpPr>
+        <p:spPr>
+          <a:xfrm>
+            <a:off x="2776237" y="3402720"/>
+            <a:ext cx="1452954" cy="0"/>
+          </a:xfrm>
+          <a:prstGeom prst="straightConnector1">
+            <a:avLst/>
+          </a:prstGeom>
+          <a:noFill/>
+          <a:ln w="6483" cap="flat">
+            <a:solidFill>
+              <a:srgbClr val="000000"/>
+            </a:solidFill>
+            <a:prstDash val="solid"/>
+            <a:miter/>
+          </a:ln>
+        </p:spPr>
+      </p:cxnSp>
+      <p:sp>
+        <p:nvSpPr>
+          <p:cNvPr id="8" name="Rectangle 12">
+            <a:extLst>
+              <a:ext uri="{FF2B5EF4-FFF2-40B4-BE49-F238E27FC236}">
+                <a16:creationId xmlns:a16="http://schemas.microsoft.com/office/drawing/2014/main" id="{A22779F1-466C-4C11-B5B0-B6F1440B40BA}"/>
+              </a:ext>
+            </a:extLst>
+          </p:cNvPr>
+          <p:cNvSpPr/>
+          <p:nvPr/>
+        </p:nvSpPr>
+        <p:spPr>
+          <a:xfrm>
+            <a:off x="6777117" y="3400570"/>
+            <a:ext cx="2479304" cy="1344570"/>
+          </a:xfrm>
+          <a:prstGeom prst="rect">
+            <a:avLst/>
+          </a:prstGeom>
+          <a:solidFill>
+            <a:srgbClr val="FFFFFF"/>
+          </a:solidFill>
+          <a:ln w="12600" cap="flat">
+            <a:solidFill>
+              <a:srgbClr val="000000"/>
+            </a:solidFill>
+            <a:prstDash val="solid"/>
+            <a:miter/>
+          </a:ln>
+        </p:spPr>
+        <p:txBody>
+          <a:bodyPr vert="horz" wrap="square" lIns="91440" tIns="45720" rIns="91440" bIns="45720" anchor="ctr" anchorCtr="1" compatLnSpc="0">
+            <a:noAutofit/>
+          </a:bodyPr>
+          <a:lstStyle/>
+          <a:p>
+            <a:pPr marL="0" marR="0" lvl="0" indent="0" algn="l" defTabSz="914400" rtl="0" fontAlgn="auto" hangingPunct="0">
+              <a:lnSpc>
+                <a:spcPct val="100000"/>
+              </a:lnSpc>
+              <a:spcBef>
+                <a:spcPts val="0"/>
+              </a:spcBef>
+              <a:spcAft>
+                <a:spcPts val="0"/>
+              </a:spcAft>
+              <a:buNone/>
+              <a:tabLst/>
+              <a:defRPr sz="1800" b="0" i="0" u="none" strike="noStrike" kern="0" cap="none" spc="0" baseline="0">
+                <a:solidFill>
+                  <a:srgbClr val="000000"/>
+                </a:solidFill>
+                <a:uFillTx/>
+              </a:defRPr>
+            </a:pPr>
+            <a:endParaRPr lang="en-GB" sz="1800" b="0" i="0" u="none" strike="noStrike" kern="1200" cap="none" spc="0" baseline="0">
+              <a:solidFill>
+                <a:srgbClr val="000000"/>
+              </a:solidFill>
+              <a:uFillTx/>
+              <a:latin typeface="Arial" pitchFamily="18"/>
+              <a:ea typeface="Microsoft YaHei" pitchFamily="2"/>
+              <a:cs typeface="Lucida Sans" pitchFamily="2"/>
+            </a:endParaRPr>
+          </a:p>
+        </p:txBody>
+      </p:sp>
+      <p:sp>
+        <p:nvSpPr>
+          <p:cNvPr id="9" name="TextBox 13">
+            <a:extLst>
+              <a:ext uri="{FF2B5EF4-FFF2-40B4-BE49-F238E27FC236}">
+                <a16:creationId xmlns:a16="http://schemas.microsoft.com/office/drawing/2014/main" id="{2D2088EB-2A64-4BC0-9CED-294F796E41EC}"/>
+              </a:ext>
+            </a:extLst>
+          </p:cNvPr>
+          <p:cNvSpPr txBox="1"/>
+          <p:nvPr/>
+        </p:nvSpPr>
+        <p:spPr>
+          <a:xfrm>
+            <a:off x="6777117" y="3400570"/>
+            <a:ext cx="2462662" cy="1219565"/>
+          </a:xfrm>
+          <a:prstGeom prst="rect">
+            <a:avLst/>
+          </a:prstGeom>
+          <a:noFill/>
+          <a:ln cap="flat">
+            <a:noFill/>
+          </a:ln>
+        </p:spPr>
+        <p:txBody>
+          <a:bodyPr vert="horz" wrap="none" lIns="91440" tIns="45720" rIns="91440" bIns="45720" anchor="t" anchorCtr="0" compatLnSpc="0">
+            <a:spAutoFit/>
+          </a:bodyPr>
+          <a:lstStyle/>
+          <a:p>
+            <a:pPr marL="0" marR="0" lvl="0" indent="0" algn="l" defTabSz="914400" rtl="0" fontAlgn="auto" hangingPunct="1">
+              <a:lnSpc>
+                <a:spcPct val="100000"/>
+              </a:lnSpc>
+              <a:spcBef>
+                <a:spcPts val="0"/>
+              </a:spcBef>
+              <a:spcAft>
+                <a:spcPts val="0"/>
+              </a:spcAft>
+              <a:buNone/>
+              <a:tabLst/>
+              <a:defRPr sz="1800" b="0" i="0" u="none" strike="noStrike" kern="0" cap="none" spc="0" baseline="0">
+                <a:solidFill>
+                  <a:srgbClr val="000000"/>
+                </a:solidFill>
+                <a:uFillTx/>
+              </a:defRPr>
+            </a:pPr>
+            <a:r>
+              <a:rPr lang="en-GB" sz="1200" b="1" i="0" u="none" strike="noStrike" kern="1200" cap="none" spc="0" baseline="0" dirty="0">
+                <a:solidFill>
+                  <a:srgbClr val="000000"/>
+                </a:solidFill>
+                <a:uFillTx/>
+                <a:latin typeface="Calibri" pitchFamily="18"/>
+                <a:ea typeface="Microsoft YaHei" pitchFamily="2"/>
+                <a:cs typeface="Lucida Sans" pitchFamily="2"/>
+              </a:rPr>
+              <a:t>booking no</a:t>
+            </a:r>
+            <a:r>
+              <a:rPr lang="en-GB" sz="1200" b="0" i="0" u="none" strike="noStrike" kern="1200" cap="none" spc="0" baseline="0" dirty="0">
+                <a:solidFill>
+                  <a:srgbClr val="000000"/>
+                </a:solidFill>
+                <a:uFillTx/>
+                <a:latin typeface="Calibri" pitchFamily="18"/>
+                <a:ea typeface="Microsoft YaHei" pitchFamily="2"/>
+                <a:cs typeface="Lucida Sans" pitchFamily="2"/>
+              </a:rPr>
+              <a:t> | </a:t>
+            </a:r>
+            <a:r>
+              <a:rPr lang="en-GB" sz="1200" b="0" i="0" u="none" strike="noStrike" kern="0" cap="none" spc="0" baseline="0" dirty="0">
+                <a:solidFill>
+                  <a:srgbClr val="000000"/>
+                </a:solidFill>
+                <a:uFillTx/>
+                <a:latin typeface="Calibri" pitchFamily="18"/>
+                <a:ea typeface="Microsoft YaHei" pitchFamily="2"/>
+                <a:cs typeface="Lucida Sans" pitchFamily="2"/>
+              </a:rPr>
+              <a:t>date</a:t>
+            </a:r>
+            <a:r>
+              <a:rPr lang="en-GB" sz="1200" b="0" i="0" u="none" strike="noStrike" kern="1200" cap="none" spc="0" baseline="0" dirty="0">
+                <a:solidFill>
+                  <a:srgbClr val="000000"/>
+                </a:solidFill>
+                <a:uFillTx/>
+                <a:latin typeface="Calibri" pitchFamily="18"/>
+                <a:ea typeface="Microsoft YaHei" pitchFamily="2"/>
+                <a:cs typeface="Lucida Sans" pitchFamily="2"/>
+              </a:rPr>
+              <a:t> | time | room no.</a:t>
+            </a:r>
+          </a:p>
+          <a:p>
+            <a:pPr marL="0" marR="0" lvl="0" indent="0" algn="l" defTabSz="914400" rtl="0" fontAlgn="auto" hangingPunct="1">
+              <a:lnSpc>
+                <a:spcPct val="100000"/>
+              </a:lnSpc>
+              <a:spcBef>
+                <a:spcPts val="0"/>
+              </a:spcBef>
+              <a:spcAft>
+                <a:spcPts val="0"/>
+              </a:spcAft>
+              <a:buNone/>
+              <a:tabLst/>
+              <a:defRPr sz="1800" b="0" i="0" u="none" strike="noStrike" kern="0" cap="none" spc="0" baseline="0">
+                <a:solidFill>
+                  <a:srgbClr val="000000"/>
+                </a:solidFill>
+                <a:uFillTx/>
+              </a:defRPr>
+            </a:pPr>
+            <a:endParaRPr lang="en-GB" sz="1200" b="1" i="0" u="none" strike="noStrike" kern="1200" cap="none" spc="0" baseline="0" dirty="0">
+              <a:solidFill>
+                <a:srgbClr val="000000"/>
+              </a:solidFill>
+              <a:uFillTx/>
+              <a:latin typeface="Calibri" pitchFamily="18"/>
+              <a:ea typeface="Microsoft YaHei" pitchFamily="2"/>
+              <a:cs typeface="Lucida Sans" pitchFamily="2"/>
+            </a:endParaRPr>
+          </a:p>
+          <a:p>
+            <a:pPr marL="0" marR="0" lvl="0" indent="0" algn="l" defTabSz="914400" rtl="0" fontAlgn="auto" hangingPunct="1">
+              <a:lnSpc>
+                <a:spcPct val="100000"/>
+              </a:lnSpc>
+              <a:spcBef>
+                <a:spcPts val="0"/>
+              </a:spcBef>
+              <a:spcAft>
+                <a:spcPts val="0"/>
+              </a:spcAft>
+              <a:buNone/>
+              <a:tabLst/>
+              <a:defRPr sz="1800" b="0" i="0" u="none" strike="noStrike" kern="0" cap="none" spc="0" baseline="0">
+                <a:solidFill>
+                  <a:srgbClr val="000000"/>
+                </a:solidFill>
+                <a:uFillTx/>
+              </a:defRPr>
+            </a:pPr>
+            <a:r>
+              <a:rPr lang="en-GB" sz="1200" b="0" i="0" u="none" strike="noStrike" kern="1200" cap="none" spc="0" baseline="0" dirty="0">
+                <a:solidFill>
+                  <a:srgbClr val="000000"/>
+                </a:solidFill>
+                <a:uFillTx/>
+                <a:latin typeface="Calibri" pitchFamily="18"/>
+                <a:ea typeface="Microsoft YaHei" pitchFamily="2"/>
+                <a:cs typeface="Lucida Sans" pitchFamily="2"/>
+              </a:rPr>
+              <a:t>                                    9 - 10</a:t>
+            </a:r>
+          </a:p>
+          <a:p>
+            <a:pPr marL="0" marR="0" lvl="0" indent="0" algn="l" defTabSz="914400" rtl="0" fontAlgn="auto" hangingPunct="1">
+              <a:lnSpc>
+                <a:spcPct val="100000"/>
+              </a:lnSpc>
+              <a:spcBef>
+                <a:spcPts val="0"/>
+              </a:spcBef>
+              <a:spcAft>
+                <a:spcPts val="0"/>
+              </a:spcAft>
+              <a:buNone/>
+              <a:tabLst/>
+              <a:defRPr sz="1800" b="0" i="0" u="none" strike="noStrike" kern="0" cap="none" spc="0" baseline="0">
+                <a:solidFill>
+                  <a:srgbClr val="000000"/>
+                </a:solidFill>
+                <a:uFillTx/>
+              </a:defRPr>
+            </a:pPr>
+            <a:r>
+              <a:rPr lang="en-GB" sz="1200" b="0" i="0" u="none" strike="noStrike" kern="1200" cap="none" spc="0" baseline="0" dirty="0">
+                <a:solidFill>
+                  <a:srgbClr val="000000"/>
+                </a:solidFill>
+                <a:uFillTx/>
+                <a:latin typeface="Calibri" pitchFamily="18"/>
+                <a:ea typeface="Microsoft YaHei" pitchFamily="2"/>
+                <a:cs typeface="Lucida Sans" pitchFamily="2"/>
+              </a:rPr>
+              <a:t>                                   10 - 11</a:t>
+            </a:r>
+          </a:p>
+          <a:p>
+            <a:pPr marL="0" marR="0" lvl="0" indent="0" algn="l" defTabSz="914400" rtl="0" fontAlgn="auto" hangingPunct="1">
+              <a:lnSpc>
+                <a:spcPct val="100000"/>
+              </a:lnSpc>
+              <a:spcBef>
+                <a:spcPts val="0"/>
+              </a:spcBef>
+              <a:spcAft>
+                <a:spcPts val="0"/>
+              </a:spcAft>
+              <a:buNone/>
+              <a:tabLst/>
+              <a:defRPr sz="1800" b="0" i="0" u="none" strike="noStrike" kern="0" cap="none" spc="0" baseline="0">
+                <a:solidFill>
+                  <a:srgbClr val="000000"/>
+                </a:solidFill>
+                <a:uFillTx/>
+              </a:defRPr>
+            </a:pPr>
+            <a:r>
+              <a:rPr lang="en-GB" sz="1200" b="0" i="0" u="none" strike="noStrike" kern="1200" cap="none" spc="0" baseline="0" dirty="0">
+                <a:solidFill>
+                  <a:srgbClr val="000000"/>
+                </a:solidFill>
+                <a:uFillTx/>
+                <a:latin typeface="Calibri" pitchFamily="18"/>
+                <a:ea typeface="Microsoft YaHei" pitchFamily="2"/>
+                <a:cs typeface="Lucida Sans" pitchFamily="2"/>
+              </a:rPr>
+              <a:t>                                       …</a:t>
+            </a:r>
+          </a:p>
+          <a:p>
+            <a:pPr marL="0" marR="0" lvl="0" indent="0" algn="l" defTabSz="914400" rtl="0" fontAlgn="auto" hangingPunct="1">
+              <a:lnSpc>
+                <a:spcPct val="100000"/>
+              </a:lnSpc>
+              <a:spcBef>
+                <a:spcPts val="0"/>
+              </a:spcBef>
+              <a:spcAft>
+                <a:spcPts val="0"/>
+              </a:spcAft>
+              <a:buNone/>
+              <a:tabLst/>
+              <a:defRPr sz="1800" b="0" i="0" u="none" strike="noStrike" kern="0" cap="none" spc="0" baseline="0">
+                <a:solidFill>
+                  <a:srgbClr val="000000"/>
+                </a:solidFill>
+                <a:uFillTx/>
+              </a:defRPr>
+            </a:pPr>
+            <a:r>
+              <a:rPr lang="en-GB" sz="1200" b="0" i="0" u="none" strike="noStrike" kern="1200" cap="none" spc="0" baseline="0" dirty="0">
+                <a:solidFill>
+                  <a:srgbClr val="000000"/>
+                </a:solidFill>
+                <a:uFillTx/>
+                <a:latin typeface="Calibri" pitchFamily="18"/>
+                <a:ea typeface="Microsoft YaHei" pitchFamily="2"/>
+                <a:cs typeface="Lucida Sans" pitchFamily="2"/>
+              </a:rPr>
+              <a:t>                                     4 - 5 </a:t>
+            </a:r>
+          </a:p>
+        </p:txBody>
+      </p:sp>
+      <p:cxnSp>
+        <p:nvCxnSpPr>
+          <p:cNvPr id="10" name="Straight Connector 14">
+            <a:extLst>
+              <a:ext uri="{FF2B5EF4-FFF2-40B4-BE49-F238E27FC236}">
+                <a16:creationId xmlns:a16="http://schemas.microsoft.com/office/drawing/2014/main" id="{8E1B0483-2741-4103-8E09-E677479DB708}"/>
+              </a:ext>
+            </a:extLst>
+          </p:cNvPr>
+          <p:cNvCxnSpPr/>
+          <p:nvPr/>
+        </p:nvCxnSpPr>
+        <p:spPr>
+          <a:xfrm>
+            <a:off x="6777117" y="3677770"/>
+            <a:ext cx="0" cy="336234"/>
+          </a:xfrm>
+          <a:prstGeom prst="straightConnector1">
+            <a:avLst/>
+          </a:prstGeom>
+          <a:noFill/>
+          <a:ln w="6483" cap="flat">
+            <a:solidFill>
+              <a:srgbClr val="000000"/>
+            </a:solidFill>
+            <a:prstDash val="solid"/>
+            <a:miter/>
+          </a:ln>
+        </p:spPr>
+      </p:cxnSp>
+      <p:sp>
+        <p:nvSpPr>
+          <p:cNvPr id="11" name="TextBox 20">
+            <a:extLst>
+              <a:ext uri="{FF2B5EF4-FFF2-40B4-BE49-F238E27FC236}">
+                <a16:creationId xmlns:a16="http://schemas.microsoft.com/office/drawing/2014/main" id="{E5BF6ECB-9FB0-43EA-9DE4-AC6EB7FB0E8F}"/>
+              </a:ext>
+            </a:extLst>
+          </p:cNvPr>
+          <p:cNvSpPr txBox="1"/>
+          <p:nvPr/>
+        </p:nvSpPr>
+        <p:spPr>
+          <a:xfrm>
+            <a:off x="2822323" y="839163"/>
+            <a:ext cx="344884" cy="276843"/>
+          </a:xfrm>
+          <a:prstGeom prst="rect">
+            <a:avLst/>
+          </a:prstGeom>
+          <a:noFill/>
+          <a:ln cap="flat">
+            <a:noFill/>
+          </a:ln>
+        </p:spPr>
+        <p:txBody>
+          <a:bodyPr vert="horz" wrap="none" lIns="91440" tIns="45720" rIns="91440" bIns="45720" anchor="t" anchorCtr="0" compatLnSpc="0">
+            <a:spAutoFit/>
+          </a:bodyPr>
+          <a:lstStyle/>
+          <a:p>
+            <a:pPr marL="0" marR="0" lvl="0" indent="0" algn="l" defTabSz="914400" rtl="0" fontAlgn="auto" hangingPunct="1">
+              <a:lnSpc>
+                <a:spcPct val="100000"/>
+              </a:lnSpc>
+              <a:spcBef>
+                <a:spcPts val="0"/>
+              </a:spcBef>
+              <a:spcAft>
+                <a:spcPts val="0"/>
+              </a:spcAft>
+              <a:buNone/>
+              <a:tabLst/>
+              <a:defRPr sz="1800" b="0" i="0" u="none" strike="noStrike" kern="0" cap="none" spc="0" baseline="0">
+                <a:solidFill>
+                  <a:srgbClr val="000000"/>
+                </a:solidFill>
+                <a:uFillTx/>
+              </a:defRPr>
+            </a:pPr>
+            <a:r>
+              <a:rPr lang="en-GB" sz="1200" b="0" i="0" u="none" strike="noStrike" kern="1200" cap="none" spc="0" baseline="0">
+                <a:solidFill>
+                  <a:srgbClr val="000000"/>
+                </a:solidFill>
+                <a:uFillTx/>
+                <a:latin typeface="Calibri" pitchFamily="18"/>
+                <a:ea typeface="Microsoft YaHei" pitchFamily="2"/>
+                <a:cs typeface="Lucida Sans" pitchFamily="2"/>
+              </a:rPr>
+              <a:t>PK</a:t>
+            </a:r>
+          </a:p>
+        </p:txBody>
+      </p:sp>
+      <p:sp>
+        <p:nvSpPr>
+          <p:cNvPr id="12" name="TextBox 21">
+            <a:extLst>
+              <a:ext uri="{FF2B5EF4-FFF2-40B4-BE49-F238E27FC236}">
+                <a16:creationId xmlns:a16="http://schemas.microsoft.com/office/drawing/2014/main" id="{2E6FEAE4-7057-419A-A1E9-5C690D5C58AD}"/>
+              </a:ext>
+            </a:extLst>
+          </p:cNvPr>
+          <p:cNvSpPr txBox="1"/>
+          <p:nvPr/>
+        </p:nvSpPr>
+        <p:spPr>
+          <a:xfrm>
+            <a:off x="2822323" y="2846883"/>
+            <a:ext cx="344884" cy="276843"/>
+          </a:xfrm>
+          <a:prstGeom prst="rect">
+            <a:avLst/>
+          </a:prstGeom>
+          <a:noFill/>
+          <a:ln cap="flat">
+            <a:noFill/>
+          </a:ln>
+        </p:spPr>
+        <p:txBody>
+          <a:bodyPr vert="horz" wrap="none" lIns="91440" tIns="45720" rIns="91440" bIns="45720" anchor="t" anchorCtr="0" compatLnSpc="0">
+            <a:spAutoFit/>
+          </a:bodyPr>
+          <a:lstStyle/>
+          <a:p>
+            <a:pPr marL="0" marR="0" lvl="0" indent="0" algn="l" defTabSz="914400" rtl="0" fontAlgn="auto" hangingPunct="1">
+              <a:lnSpc>
+                <a:spcPct val="100000"/>
+              </a:lnSpc>
+              <a:spcBef>
+                <a:spcPts val="0"/>
+              </a:spcBef>
+              <a:spcAft>
+                <a:spcPts val="0"/>
+              </a:spcAft>
+              <a:buNone/>
+              <a:tabLst/>
+              <a:defRPr sz="1800" b="0" i="0" u="none" strike="noStrike" kern="0" cap="none" spc="0" baseline="0">
+                <a:solidFill>
+                  <a:srgbClr val="000000"/>
+                </a:solidFill>
+                <a:uFillTx/>
+              </a:defRPr>
+            </a:pPr>
+            <a:r>
+              <a:rPr lang="en-GB" sz="1200" b="0" i="0" u="none" strike="noStrike" kern="1200" cap="none" spc="0" baseline="0">
+                <a:solidFill>
+                  <a:srgbClr val="000000"/>
+                </a:solidFill>
+                <a:uFillTx/>
+                <a:latin typeface="Calibri" pitchFamily="18"/>
+                <a:ea typeface="Microsoft YaHei" pitchFamily="2"/>
+                <a:cs typeface="Lucida Sans" pitchFamily="2"/>
+              </a:rPr>
+              <a:t>PK</a:t>
+            </a:r>
+          </a:p>
+        </p:txBody>
+      </p:sp>
+      <p:sp>
+        <p:nvSpPr>
+          <p:cNvPr id="13" name="TextBox 22">
+            <a:extLst>
+              <a:ext uri="{FF2B5EF4-FFF2-40B4-BE49-F238E27FC236}">
+                <a16:creationId xmlns:a16="http://schemas.microsoft.com/office/drawing/2014/main" id="{23D9ACC9-E2B1-4329-A44D-6F7175CBFBBA}"/>
+              </a:ext>
+            </a:extLst>
+          </p:cNvPr>
+          <p:cNvSpPr txBox="1"/>
+          <p:nvPr/>
+        </p:nvSpPr>
+        <p:spPr>
+          <a:xfrm>
+            <a:off x="8650915" y="3138430"/>
+            <a:ext cx="344884" cy="276843"/>
+          </a:xfrm>
+          <a:prstGeom prst="rect">
+            <a:avLst/>
+          </a:prstGeom>
+          <a:noFill/>
+          <a:ln cap="flat">
+            <a:noFill/>
+          </a:ln>
+        </p:spPr>
+        <p:txBody>
+          <a:bodyPr vert="horz" wrap="none" lIns="91440" tIns="45720" rIns="91440" bIns="45720" anchor="t" anchorCtr="0" compatLnSpc="0">
+            <a:spAutoFit/>
+          </a:bodyPr>
+          <a:lstStyle/>
+          <a:p>
+            <a:pPr marL="0" marR="0" lvl="0" indent="0" algn="l" defTabSz="914400" rtl="0" fontAlgn="auto" hangingPunct="1">
+              <a:lnSpc>
+                <a:spcPct val="100000"/>
+              </a:lnSpc>
+              <a:spcBef>
+                <a:spcPts val="0"/>
+              </a:spcBef>
+              <a:spcAft>
+                <a:spcPts val="0"/>
+              </a:spcAft>
+              <a:buNone/>
+              <a:tabLst/>
+              <a:defRPr sz="1800" b="0" i="0" u="none" strike="noStrike" kern="0" cap="none" spc="0" baseline="0">
+                <a:solidFill>
+                  <a:srgbClr val="000000"/>
+                </a:solidFill>
+                <a:uFillTx/>
+              </a:defRPr>
+            </a:pPr>
+            <a:r>
+              <a:rPr lang="en-GB" sz="1200" b="0" i="0" u="none" strike="noStrike" kern="1200" cap="none" spc="0" baseline="0">
+                <a:solidFill>
+                  <a:srgbClr val="000000"/>
+                </a:solidFill>
+                <a:uFillTx/>
+                <a:latin typeface="Calibri" pitchFamily="18"/>
+                <a:ea typeface="Microsoft YaHei" pitchFamily="2"/>
+                <a:cs typeface="Lucida Sans" pitchFamily="2"/>
+              </a:rPr>
+              <a:t>PK</a:t>
+            </a:r>
+          </a:p>
+        </p:txBody>
+      </p:sp>
+      <p:sp>
+        <p:nvSpPr>
+          <p:cNvPr id="14" name="TextBox 23">
+            <a:extLst>
+              <a:ext uri="{FF2B5EF4-FFF2-40B4-BE49-F238E27FC236}">
+                <a16:creationId xmlns:a16="http://schemas.microsoft.com/office/drawing/2014/main" id="{60016821-BA72-4631-AEE8-957AF75F2825}"/>
+              </a:ext>
+            </a:extLst>
+          </p:cNvPr>
+          <p:cNvSpPr txBox="1"/>
+          <p:nvPr/>
+        </p:nvSpPr>
+        <p:spPr>
+          <a:xfrm>
+            <a:off x="4354116" y="2355119"/>
+            <a:ext cx="1103123" cy="280208"/>
+          </a:xfrm>
+          <a:prstGeom prst="rect">
+            <a:avLst/>
+          </a:prstGeom>
+          <a:noFill/>
+          <a:ln cap="flat">
+            <a:noFill/>
+          </a:ln>
+        </p:spPr>
+        <p:txBody>
+          <a:bodyPr vert="horz" wrap="none" lIns="91440" tIns="45720" rIns="91440" bIns="45720" anchor="t" anchorCtr="0" compatLnSpc="0">
+            <a:spAutoFit/>
+          </a:bodyPr>
+          <a:lstStyle/>
+          <a:p>
+            <a:pPr marL="0" marR="0" lvl="0" indent="0" algn="l" defTabSz="914400" rtl="0" fontAlgn="auto" hangingPunct="1">
+              <a:lnSpc>
+                <a:spcPct val="100000"/>
+              </a:lnSpc>
+              <a:spcBef>
+                <a:spcPts val="0"/>
+              </a:spcBef>
+              <a:spcAft>
+                <a:spcPts val="0"/>
+              </a:spcAft>
+              <a:buNone/>
+              <a:tabLst/>
+              <a:defRPr sz="1800" b="0" i="0" u="none" strike="noStrike" kern="0" cap="none" spc="0" baseline="0">
+                <a:solidFill>
+                  <a:srgbClr val="000000"/>
+                </a:solidFill>
+                <a:uFillTx/>
+              </a:defRPr>
+            </a:pPr>
+            <a:r>
+              <a:rPr lang="en-GB" sz="1200" b="0" i="0" u="none" strike="noStrike" kern="1200" cap="none" spc="0" baseline="0">
+                <a:solidFill>
+                  <a:srgbClr val="000000"/>
+                </a:solidFill>
+                <a:uFillTx/>
+                <a:latin typeface="Calibri" pitchFamily="18"/>
+                <a:ea typeface="Microsoft YaHei" pitchFamily="2"/>
+                <a:cs typeface="Lucida Sans" pitchFamily="2"/>
+              </a:rPr>
+              <a:t>PERSON TABLE</a:t>
+            </a:r>
+          </a:p>
+        </p:txBody>
+      </p:sp>
+      <p:sp>
+        <p:nvSpPr>
+          <p:cNvPr id="15" name="TextBox 24">
+            <a:extLst>
+              <a:ext uri="{FF2B5EF4-FFF2-40B4-BE49-F238E27FC236}">
+                <a16:creationId xmlns:a16="http://schemas.microsoft.com/office/drawing/2014/main" id="{8C2B84E4-8F44-41F5-954C-8B6573297869}"/>
+              </a:ext>
+            </a:extLst>
+          </p:cNvPr>
+          <p:cNvSpPr txBox="1"/>
+          <p:nvPr/>
+        </p:nvSpPr>
+        <p:spPr>
+          <a:xfrm>
+            <a:off x="3031556" y="4380067"/>
+            <a:ext cx="1197635" cy="280208"/>
+          </a:xfrm>
+          <a:prstGeom prst="rect">
+            <a:avLst/>
+          </a:prstGeom>
+          <a:noFill/>
+          <a:ln cap="flat">
+            <a:noFill/>
+          </a:ln>
+        </p:spPr>
+        <p:txBody>
+          <a:bodyPr vert="horz" wrap="none" lIns="91440" tIns="45720" rIns="91440" bIns="45720" anchor="t" anchorCtr="0" compatLnSpc="0">
+            <a:spAutoFit/>
+          </a:bodyPr>
+          <a:lstStyle/>
+          <a:p>
+            <a:pPr marL="0" marR="0" lvl="0" indent="0" algn="l" defTabSz="914400" rtl="0" fontAlgn="auto" hangingPunct="1">
+              <a:lnSpc>
+                <a:spcPct val="100000"/>
+              </a:lnSpc>
+              <a:spcBef>
+                <a:spcPts val="0"/>
+              </a:spcBef>
+              <a:spcAft>
+                <a:spcPts val="0"/>
+              </a:spcAft>
+              <a:buNone/>
+              <a:tabLst/>
+              <a:defRPr sz="1800" b="0" i="0" u="none" strike="noStrike" kern="0" cap="none" spc="0" baseline="0">
+                <a:solidFill>
+                  <a:srgbClr val="000000"/>
+                </a:solidFill>
+                <a:uFillTx/>
+              </a:defRPr>
+            </a:pPr>
+            <a:r>
+              <a:rPr lang="en-GB" sz="1200" b="0" i="0" u="none" strike="noStrike" kern="1200" cap="none" spc="0" baseline="0">
+                <a:solidFill>
+                  <a:srgbClr val="000000"/>
+                </a:solidFill>
+                <a:uFillTx/>
+                <a:latin typeface="Calibri" pitchFamily="18"/>
+                <a:ea typeface="Microsoft YaHei" pitchFamily="2"/>
+                <a:cs typeface="Lucida Sans" pitchFamily="2"/>
+              </a:rPr>
+              <a:t>BOOKING TABLE</a:t>
+            </a:r>
+          </a:p>
+        </p:txBody>
+      </p:sp>
+      <p:sp>
+        <p:nvSpPr>
+          <p:cNvPr id="16" name="TextBox 25">
+            <a:extLst>
+              <a:ext uri="{FF2B5EF4-FFF2-40B4-BE49-F238E27FC236}">
+                <a16:creationId xmlns:a16="http://schemas.microsoft.com/office/drawing/2014/main" id="{E1D204DB-E0EB-426C-B3AD-B07436A37182}"/>
+              </a:ext>
+            </a:extLst>
+          </p:cNvPr>
+          <p:cNvSpPr txBox="1"/>
+          <p:nvPr/>
+        </p:nvSpPr>
+        <p:spPr>
+          <a:xfrm>
+            <a:off x="8082798" y="4741775"/>
+            <a:ext cx="1272652" cy="280208"/>
+          </a:xfrm>
+          <a:prstGeom prst="rect">
+            <a:avLst/>
+          </a:prstGeom>
+          <a:noFill/>
+          <a:ln cap="flat">
+            <a:noFill/>
+          </a:ln>
+        </p:spPr>
+        <p:txBody>
+          <a:bodyPr vert="horz" wrap="none" lIns="91440" tIns="45720" rIns="91440" bIns="45720" anchor="t" anchorCtr="0" compatLnSpc="0">
+            <a:spAutoFit/>
+          </a:bodyPr>
+          <a:lstStyle/>
+          <a:p>
+            <a:pPr marL="0" marR="0" lvl="0" indent="0" algn="l" defTabSz="914400" rtl="0" fontAlgn="auto" hangingPunct="1">
+              <a:lnSpc>
+                <a:spcPct val="100000"/>
+              </a:lnSpc>
+              <a:spcBef>
+                <a:spcPts val="0"/>
+              </a:spcBef>
+              <a:spcAft>
+                <a:spcPts val="0"/>
+              </a:spcAft>
+              <a:buNone/>
+              <a:tabLst/>
+              <a:defRPr sz="1800" b="0" i="0" u="none" strike="noStrike" kern="0" cap="none" spc="0" baseline="0">
+                <a:solidFill>
+                  <a:srgbClr val="000000"/>
+                </a:solidFill>
+                <a:uFillTx/>
+              </a:defRPr>
+            </a:pPr>
+            <a:r>
+              <a:rPr lang="en-GB" sz="1200" b="0" i="0" u="none" strike="noStrike" kern="0" cap="none" spc="0" baseline="0">
+                <a:solidFill>
+                  <a:srgbClr val="000000"/>
+                </a:solidFill>
+                <a:uFillTx/>
+                <a:latin typeface="Calibri" pitchFamily="18"/>
+                <a:ea typeface="Microsoft YaHei" pitchFamily="2"/>
+                <a:cs typeface="Lucida Sans" pitchFamily="2"/>
+              </a:rPr>
+              <a:t>CALENDAR</a:t>
+            </a:r>
+            <a:r>
+              <a:rPr lang="en-GB" sz="1200" b="0" i="0" u="none" strike="noStrike" kern="1200" cap="none" spc="0" baseline="0">
+                <a:solidFill>
+                  <a:srgbClr val="000000"/>
+                </a:solidFill>
+                <a:uFillTx/>
+                <a:latin typeface="Calibri" pitchFamily="18"/>
+                <a:ea typeface="Microsoft YaHei" pitchFamily="2"/>
+                <a:cs typeface="Lucida Sans" pitchFamily="2"/>
+              </a:rPr>
+              <a:t> TABLE</a:t>
+            </a:r>
+          </a:p>
+        </p:txBody>
+      </p:sp>
+      <p:cxnSp>
+        <p:nvCxnSpPr>
+          <p:cNvPr id="17" name="Connector: Elbow 28">
+            <a:extLst>
+              <a:ext uri="{FF2B5EF4-FFF2-40B4-BE49-F238E27FC236}">
+                <a16:creationId xmlns:a16="http://schemas.microsoft.com/office/drawing/2014/main" id="{ED726993-41D8-46B6-B92C-9AD92162BE39}"/>
+              </a:ext>
+            </a:extLst>
+          </p:cNvPr>
+          <p:cNvCxnSpPr>
+            <a:stCxn id="2" idx="1"/>
+            <a:endCxn id="5" idx="1"/>
+          </p:cNvCxnSpPr>
+          <p:nvPr/>
+        </p:nvCxnSpPr>
+        <p:spPr>
+          <a:xfrm rot="10800000" flipV="1">
+            <a:off x="2776237" y="1729435"/>
+            <a:ext cx="27002" cy="2009879"/>
+          </a:xfrm>
+          <a:prstGeom prst="bentConnector3">
+            <a:avLst>
+              <a:gd name="adj1" fmla="val 946604"/>
+            </a:avLst>
+          </a:prstGeom>
+          <a:noFill/>
+          <a:ln w="6483" cap="flat">
+            <a:solidFill>
+              <a:srgbClr val="000000"/>
+            </a:solidFill>
+            <a:prstDash val="solid"/>
+            <a:miter/>
+          </a:ln>
+        </p:spPr>
+      </p:cxnSp>
+      <p:sp>
+        <p:nvSpPr>
+          <p:cNvPr id="18" name="Oval 29">
+            <a:extLst>
+              <a:ext uri="{FF2B5EF4-FFF2-40B4-BE49-F238E27FC236}">
+                <a16:creationId xmlns:a16="http://schemas.microsoft.com/office/drawing/2014/main" id="{EC9357E4-F9D6-488E-8982-CE118F8C084C}"/>
+              </a:ext>
+            </a:extLst>
+          </p:cNvPr>
+          <p:cNvSpPr/>
+          <p:nvPr/>
+        </p:nvSpPr>
+        <p:spPr>
+          <a:xfrm>
+            <a:off x="2617844" y="3682078"/>
+            <a:ext cx="96844" cy="114482"/>
+          </a:xfrm>
+          <a:custGeom>
+            <a:avLst/>
+            <a:gdLst>
+              <a:gd name="f0" fmla="val 21600000"/>
+              <a:gd name="f1" fmla="val 10800000"/>
+              <a:gd name="f2" fmla="val 5400000"/>
+              <a:gd name="f3" fmla="val 180"/>
+              <a:gd name="f4" fmla="val w"/>
+              <a:gd name="f5" fmla="val h"/>
+              <a:gd name="f6" fmla="val ss"/>
+              <a:gd name="f7" fmla="val 0"/>
+              <a:gd name="f8" fmla="*/ 5419351 1 1725033"/>
+              <a:gd name="f9" fmla="+- 0 0 0"/>
+              <a:gd name="f10" fmla="abs f4"/>
+              <a:gd name="f11" fmla="abs f5"/>
+              <a:gd name="f12" fmla="abs f6"/>
+              <a:gd name="f13" fmla="+- 2700000 f2 0"/>
+              <a:gd name="f14" fmla="*/ f9 f1 1"/>
+              <a:gd name="f15" fmla="?: f10 f4 1"/>
+              <a:gd name="f16" fmla="?: f11 f5 1"/>
+              <a:gd name="f17" fmla="?: f12 f6 1"/>
+              <a:gd name="f18" fmla="+- f13 0 f2"/>
+              <a:gd name="f19" fmla="*/ f14 1 f3"/>
+              <a:gd name="f20" fmla="*/ f15 1 21600"/>
+              <a:gd name="f21" fmla="*/ f16 1 21600"/>
+              <a:gd name="f22" fmla="*/ 21600 f15 1"/>
+              <a:gd name="f23" fmla="*/ 21600 f16 1"/>
+              <a:gd name="f24" fmla="+- f18 f2 0"/>
+              <a:gd name="f25" fmla="+- f19 0 f2"/>
+              <a:gd name="f26" fmla="min f21 f20"/>
+              <a:gd name="f27" fmla="*/ f22 1 f17"/>
+              <a:gd name="f28" fmla="*/ f23 1 f17"/>
+              <a:gd name="f29" fmla="*/ f24 f8 1"/>
+              <a:gd name="f30" fmla="val f27"/>
+              <a:gd name="f31" fmla="val f28"/>
+              <a:gd name="f32" fmla="*/ f29 1 f1"/>
+              <a:gd name="f33" fmla="*/ f7 f26 1"/>
+              <a:gd name="f34" fmla="+- f31 0 f7"/>
+              <a:gd name="f35" fmla="+- f30 0 f7"/>
+              <a:gd name="f36" fmla="+- 0 0 f32"/>
+              <a:gd name="f37" fmla="*/ f34 1 2"/>
+              <a:gd name="f38" fmla="*/ f35 1 2"/>
+              <a:gd name="f39" fmla="+- 0 0 f36"/>
+              <a:gd name="f40" fmla="+- f7 f37 0"/>
+              <a:gd name="f41" fmla="+- f7 f38 0"/>
+              <a:gd name="f42" fmla="*/ f39 f1 1"/>
+              <a:gd name="f43" fmla="*/ f38 f26 1"/>
+              <a:gd name="f44" fmla="*/ f37 f26 1"/>
+              <a:gd name="f45" fmla="*/ f42 1 f8"/>
+              <a:gd name="f46" fmla="*/ f40 f26 1"/>
+              <a:gd name="f47" fmla="+- f45 0 f2"/>
+              <a:gd name="f48" fmla="cos 1 f47"/>
+              <a:gd name="f49" fmla="sin 1 f47"/>
+              <a:gd name="f50" fmla="+- 0 0 f48"/>
+              <a:gd name="f51" fmla="+- 0 0 f49"/>
+              <a:gd name="f52" fmla="+- 0 0 f50"/>
+              <a:gd name="f53" fmla="+- 0 0 f51"/>
+              <a:gd name="f54" fmla="val f52"/>
+              <a:gd name="f55" fmla="val f53"/>
+              <a:gd name="f56" fmla="*/ f54 f38 1"/>
+              <a:gd name="f57" fmla="*/ f55 f37 1"/>
+              <a:gd name="f58" fmla="+- f41 0 f56"/>
+              <a:gd name="f59" fmla="+- f41 f56 0"/>
+              <a:gd name="f60" fmla="+- f40 0 f57"/>
+              <a:gd name="f61" fmla="+- f40 f57 0"/>
+              <a:gd name="f62" fmla="*/ f58 f26 1"/>
+              <a:gd name="f63" fmla="*/ f60 f26 1"/>
+              <a:gd name="f64" fmla="*/ f59 f26 1"/>
+              <a:gd name="f65" fmla="*/ f61 f26 1"/>
+            </a:gdLst>
+            <a:ahLst/>
+            <a:cxnLst>
+              <a:cxn ang="3cd4">
+                <a:pos x="hc" y="t"/>
+              </a:cxn>
+              <a:cxn ang="0">
+                <a:pos x="r" y="vc"/>
+              </a:cxn>
+              <a:cxn ang="cd4">
+                <a:pos x="hc" y="b"/>
+              </a:cxn>
+              <a:cxn ang="cd2">
+                <a:pos x="l" y="vc"/>
+              </a:cxn>
+              <a:cxn ang="f25">
+                <a:pos x="f62" y="f63"/>
+              </a:cxn>
+              <a:cxn ang="f25">
+                <a:pos x="f62" y="f65"/>
+              </a:cxn>
+              <a:cxn ang="f25">
+                <a:pos x="f64" y="f65"/>
+              </a:cxn>
+              <a:cxn ang="f25">
+                <a:pos x="f64" y="f63"/>
+              </a:cxn>
+            </a:cxnLst>
+            <a:rect l="f62" t="f63" r="f64" b="f65"/>
+            <a:pathLst>
+              <a:path>
+                <a:moveTo>
+                  <a:pt x="f33" y="f46"/>
+                </a:moveTo>
+                <a:arcTo wR="f43" hR="f44" stAng="f1" swAng="f0"/>
+                <a:close/>
+              </a:path>
+            </a:pathLst>
+          </a:custGeom>
+          <a:solidFill>
+            <a:srgbClr val="FFFFFF"/>
+          </a:solidFill>
+          <a:ln w="12600" cap="flat">
+            <a:solidFill>
+              <a:srgbClr val="000000"/>
+            </a:solidFill>
+            <a:prstDash val="solid"/>
+            <a:miter/>
+          </a:ln>
+        </p:spPr>
+        <p:txBody>
+          <a:bodyPr vert="horz" wrap="square" lIns="91440" tIns="45720" rIns="91440" bIns="45720" anchor="ctr" anchorCtr="1" compatLnSpc="0">
+            <a:noAutofit/>
+          </a:bodyPr>
+          <a:lstStyle/>
+          <a:p>
+            <a:pPr marL="0" marR="0" lvl="0" indent="0" algn="l" defTabSz="914400" rtl="0" fontAlgn="auto" hangingPunct="0">
+              <a:lnSpc>
+                <a:spcPct val="100000"/>
+              </a:lnSpc>
+              <a:spcBef>
+                <a:spcPts val="0"/>
+              </a:spcBef>
+              <a:spcAft>
+                <a:spcPts val="0"/>
+              </a:spcAft>
+              <a:buNone/>
+              <a:tabLst/>
+              <a:defRPr sz="1800" b="0" i="0" u="none" strike="noStrike" kern="0" cap="none" spc="0" baseline="0">
+                <a:solidFill>
+                  <a:srgbClr val="000000"/>
+                </a:solidFill>
+                <a:uFillTx/>
+              </a:defRPr>
+            </a:pPr>
+            <a:endParaRPr lang="en-GB" sz="1800" b="0" i="0" u="none" strike="noStrike" kern="1200" cap="none" spc="0" baseline="0">
+              <a:solidFill>
+                <a:srgbClr val="000000"/>
+              </a:solidFill>
+              <a:uFillTx/>
+              <a:latin typeface="Arial" pitchFamily="18"/>
+              <a:ea typeface="Microsoft YaHei" pitchFamily="2"/>
+              <a:cs typeface="Lucida Sans" pitchFamily="2"/>
+            </a:endParaRPr>
+          </a:p>
+        </p:txBody>
+      </p:sp>
+      <p:cxnSp>
+        <p:nvCxnSpPr>
+          <p:cNvPr id="19" name="Connector: Elbow 31">
+            <a:extLst>
+              <a:ext uri="{FF2B5EF4-FFF2-40B4-BE49-F238E27FC236}">
+                <a16:creationId xmlns:a16="http://schemas.microsoft.com/office/drawing/2014/main" id="{6CDFED8F-1CB9-46E0-86E3-C48A56E8362F}"/>
+              </a:ext>
+            </a:extLst>
+          </p:cNvPr>
+          <p:cNvCxnSpPr>
+            <a:cxnSpLocks/>
+            <a:stCxn id="5" idx="3"/>
+            <a:endCxn id="9" idx="1"/>
+          </p:cNvCxnSpPr>
+          <p:nvPr/>
+        </p:nvCxnSpPr>
+        <p:spPr>
+          <a:xfrm>
+            <a:off x="4229200" y="3739315"/>
+            <a:ext cx="2547917" cy="271038"/>
+          </a:xfrm>
+          <a:prstGeom prst="bentConnector3">
+            <a:avLst>
+              <a:gd name="adj1" fmla="val 50000"/>
+            </a:avLst>
+          </a:prstGeom>
+          <a:noFill/>
+          <a:ln w="6483" cap="flat">
+            <a:solidFill>
+              <a:srgbClr val="000000"/>
+            </a:solidFill>
+            <a:prstDash val="solid"/>
+            <a:miter/>
+          </a:ln>
+        </p:spPr>
+      </p:cxnSp>
+      <p:sp>
+        <p:nvSpPr>
+          <p:cNvPr id="20" name="Oval 32">
+            <a:extLst>
+              <a:ext uri="{FF2B5EF4-FFF2-40B4-BE49-F238E27FC236}">
+                <a16:creationId xmlns:a16="http://schemas.microsoft.com/office/drawing/2014/main" id="{89EB87CB-FB44-4E69-9C49-3D5DEB68B01B}"/>
+              </a:ext>
+            </a:extLst>
+          </p:cNvPr>
+          <p:cNvSpPr/>
+          <p:nvPr/>
+        </p:nvSpPr>
+        <p:spPr>
+          <a:xfrm>
+            <a:off x="6596150" y="3940061"/>
+            <a:ext cx="96844" cy="114482"/>
+          </a:xfrm>
+          <a:custGeom>
+            <a:avLst/>
+            <a:gdLst>
+              <a:gd name="f0" fmla="val 21600000"/>
+              <a:gd name="f1" fmla="val 10800000"/>
+              <a:gd name="f2" fmla="val 5400000"/>
+              <a:gd name="f3" fmla="val 180"/>
+              <a:gd name="f4" fmla="val w"/>
+              <a:gd name="f5" fmla="val h"/>
+              <a:gd name="f6" fmla="val ss"/>
+              <a:gd name="f7" fmla="val 0"/>
+              <a:gd name="f8" fmla="*/ 5419351 1 1725033"/>
+              <a:gd name="f9" fmla="+- 0 0 0"/>
+              <a:gd name="f10" fmla="abs f4"/>
+              <a:gd name="f11" fmla="abs f5"/>
+              <a:gd name="f12" fmla="abs f6"/>
+              <a:gd name="f13" fmla="+- 2700000 f2 0"/>
+              <a:gd name="f14" fmla="*/ f9 f1 1"/>
+              <a:gd name="f15" fmla="?: f10 f4 1"/>
+              <a:gd name="f16" fmla="?: f11 f5 1"/>
+              <a:gd name="f17" fmla="?: f12 f6 1"/>
+              <a:gd name="f18" fmla="+- f13 0 f2"/>
+              <a:gd name="f19" fmla="*/ f14 1 f3"/>
+              <a:gd name="f20" fmla="*/ f15 1 21600"/>
+              <a:gd name="f21" fmla="*/ f16 1 21600"/>
+              <a:gd name="f22" fmla="*/ 21600 f15 1"/>
+              <a:gd name="f23" fmla="*/ 21600 f16 1"/>
+              <a:gd name="f24" fmla="+- f18 f2 0"/>
+              <a:gd name="f25" fmla="+- f19 0 f2"/>
+              <a:gd name="f26" fmla="min f21 f20"/>
+              <a:gd name="f27" fmla="*/ f22 1 f17"/>
+              <a:gd name="f28" fmla="*/ f23 1 f17"/>
+              <a:gd name="f29" fmla="*/ f24 f8 1"/>
+              <a:gd name="f30" fmla="val f27"/>
+              <a:gd name="f31" fmla="val f28"/>
+              <a:gd name="f32" fmla="*/ f29 1 f1"/>
+              <a:gd name="f33" fmla="*/ f7 f26 1"/>
+              <a:gd name="f34" fmla="+- f31 0 f7"/>
+              <a:gd name="f35" fmla="+- f30 0 f7"/>
+              <a:gd name="f36" fmla="+- 0 0 f32"/>
+              <a:gd name="f37" fmla="*/ f34 1 2"/>
+              <a:gd name="f38" fmla="*/ f35 1 2"/>
+              <a:gd name="f39" fmla="+- 0 0 f36"/>
+              <a:gd name="f40" fmla="+- f7 f37 0"/>
+              <a:gd name="f41" fmla="+- f7 f38 0"/>
+              <a:gd name="f42" fmla="*/ f39 f1 1"/>
+              <a:gd name="f43" fmla="*/ f38 f26 1"/>
+              <a:gd name="f44" fmla="*/ f37 f26 1"/>
+              <a:gd name="f45" fmla="*/ f42 1 f8"/>
+              <a:gd name="f46" fmla="*/ f40 f26 1"/>
+              <a:gd name="f47" fmla="+- f45 0 f2"/>
+              <a:gd name="f48" fmla="cos 1 f47"/>
+              <a:gd name="f49" fmla="sin 1 f47"/>
+              <a:gd name="f50" fmla="+- 0 0 f48"/>
+              <a:gd name="f51" fmla="+- 0 0 f49"/>
+              <a:gd name="f52" fmla="+- 0 0 f50"/>
+              <a:gd name="f53" fmla="+- 0 0 f51"/>
+              <a:gd name="f54" fmla="val f52"/>
+              <a:gd name="f55" fmla="val f53"/>
+              <a:gd name="f56" fmla="*/ f54 f38 1"/>
+              <a:gd name="f57" fmla="*/ f55 f37 1"/>
+              <a:gd name="f58" fmla="+- f41 0 f56"/>
+              <a:gd name="f59" fmla="+- f41 f56 0"/>
+              <a:gd name="f60" fmla="+- f40 0 f57"/>
+              <a:gd name="f61" fmla="+- f40 f57 0"/>
+              <a:gd name="f62" fmla="*/ f58 f26 1"/>
+              <a:gd name="f63" fmla="*/ f60 f26 1"/>
+              <a:gd name="f64" fmla="*/ f59 f26 1"/>
+              <a:gd name="f65" fmla="*/ f61 f26 1"/>
+            </a:gdLst>
+            <a:ahLst/>
+            <a:cxnLst>
+              <a:cxn ang="3cd4">
+                <a:pos x="hc" y="t"/>
+              </a:cxn>
+              <a:cxn ang="0">
+                <a:pos x="r" y="vc"/>
+              </a:cxn>
+              <a:cxn ang="cd4">
+                <a:pos x="hc" y="b"/>
+              </a:cxn>
+              <a:cxn ang="cd2">
+                <a:pos x="l" y="vc"/>
+              </a:cxn>
+              <a:cxn ang="f25">
+                <a:pos x="f62" y="f63"/>
+              </a:cxn>
+              <a:cxn ang="f25">
+                <a:pos x="f62" y="f65"/>
+              </a:cxn>
+              <a:cxn ang="f25">
+                <a:pos x="f64" y="f65"/>
+              </a:cxn>
+              <a:cxn ang="f25">
+                <a:pos x="f64" y="f63"/>
+              </a:cxn>
+            </a:cxnLst>
+            <a:rect l="f62" t="f63" r="f64" b="f65"/>
+            <a:pathLst>
+              <a:path>
+                <a:moveTo>
+                  <a:pt x="f33" y="f46"/>
+                </a:moveTo>
+                <a:arcTo wR="f43" hR="f44" stAng="f1" swAng="f0"/>
+                <a:close/>
+              </a:path>
+            </a:pathLst>
+          </a:custGeom>
+          <a:solidFill>
+            <a:srgbClr val="FFFFFF"/>
+          </a:solidFill>
+          <a:ln w="12600" cap="flat">
+            <a:solidFill>
+              <a:srgbClr val="000000"/>
+            </a:solidFill>
+            <a:prstDash val="solid"/>
+            <a:miter/>
+          </a:ln>
+        </p:spPr>
+        <p:txBody>
+          <a:bodyPr vert="horz" wrap="square" lIns="91440" tIns="45720" rIns="91440" bIns="45720" anchor="ctr" anchorCtr="1" compatLnSpc="0">
+            <a:noAutofit/>
+          </a:bodyPr>
+          <a:lstStyle/>
+          <a:p>
+            <a:pPr marL="0" marR="0" lvl="0" indent="0" algn="l" defTabSz="914400" rtl="0" fontAlgn="auto" hangingPunct="0">
+              <a:lnSpc>
+                <a:spcPct val="100000"/>
+              </a:lnSpc>
+              <a:spcBef>
+                <a:spcPts val="0"/>
+              </a:spcBef>
+              <a:spcAft>
+                <a:spcPts val="0"/>
+              </a:spcAft>
+              <a:buNone/>
+              <a:tabLst/>
+              <a:defRPr sz="1800" b="0" i="0" u="none" strike="noStrike" kern="0" cap="none" spc="0" baseline="0">
+                <a:solidFill>
+                  <a:srgbClr val="000000"/>
+                </a:solidFill>
+                <a:uFillTx/>
+              </a:defRPr>
+            </a:pPr>
+            <a:endParaRPr lang="en-GB" sz="1800" b="0" i="0" u="none" strike="noStrike" kern="1200" cap="none" spc="0" baseline="0">
+              <a:solidFill>
+                <a:srgbClr val="000000"/>
+              </a:solidFill>
+              <a:uFillTx/>
+              <a:latin typeface="Arial" pitchFamily="18"/>
+              <a:ea typeface="Microsoft YaHei" pitchFamily="2"/>
+              <a:cs typeface="Lucida Sans" pitchFamily="2"/>
+            </a:endParaRPr>
+          </a:p>
+        </p:txBody>
+      </p:sp>
+      <p:cxnSp>
+        <p:nvCxnSpPr>
+          <p:cNvPr id="21" name="Straight Connector 10">
+            <a:extLst>
+              <a:ext uri="{FF2B5EF4-FFF2-40B4-BE49-F238E27FC236}">
+                <a16:creationId xmlns:a16="http://schemas.microsoft.com/office/drawing/2014/main" id="{AA413917-0157-4001-863B-A482BC4BCABC}"/>
+              </a:ext>
+            </a:extLst>
+          </p:cNvPr>
+          <p:cNvCxnSpPr/>
+          <p:nvPr/>
+        </p:nvCxnSpPr>
+        <p:spPr>
+          <a:xfrm>
+            <a:off x="6831835" y="3679562"/>
+            <a:ext cx="2424587" cy="0"/>
+          </a:xfrm>
+          <a:prstGeom prst="straightConnector1">
+            <a:avLst/>
+          </a:prstGeom>
+          <a:noFill/>
+          <a:ln w="6483" cap="flat">
+            <a:solidFill>
+              <a:srgbClr val="000000"/>
+            </a:solidFill>
+            <a:prstDash val="solid"/>
+            <a:miter/>
+          </a:ln>
+        </p:spPr>
+      </p:cxnSp>
+      <p:sp>
+        <p:nvSpPr>
+          <p:cNvPr id="22" name="TextBox 22">
+            <a:extLst>
+              <a:ext uri="{FF2B5EF4-FFF2-40B4-BE49-F238E27FC236}">
+                <a16:creationId xmlns:a16="http://schemas.microsoft.com/office/drawing/2014/main" id="{F2E8C0B9-7008-482F-9DD6-1F0064DA2009}"/>
+              </a:ext>
+            </a:extLst>
+          </p:cNvPr>
+          <p:cNvSpPr txBox="1"/>
+          <p:nvPr/>
+        </p:nvSpPr>
+        <p:spPr>
+          <a:xfrm>
+            <a:off x="7714761" y="3123726"/>
+            <a:ext cx="344884" cy="276843"/>
+          </a:xfrm>
+          <a:prstGeom prst="rect">
+            <a:avLst/>
+          </a:prstGeom>
+          <a:noFill/>
+          <a:ln cap="flat">
+            <a:noFill/>
+          </a:ln>
+        </p:spPr>
+        <p:txBody>
+          <a:bodyPr vert="horz" wrap="none" lIns="91440" tIns="45720" rIns="91440" bIns="45720" anchor="t" anchorCtr="0" compatLnSpc="0">
+            <a:spAutoFit/>
+          </a:bodyPr>
+          <a:lstStyle/>
+          <a:p>
+            <a:pPr marL="0" marR="0" lvl="0" indent="0" algn="l" defTabSz="914400" rtl="0" fontAlgn="auto" hangingPunct="1">
+              <a:lnSpc>
+                <a:spcPct val="100000"/>
+              </a:lnSpc>
+              <a:spcBef>
+                <a:spcPts val="0"/>
+              </a:spcBef>
+              <a:spcAft>
+                <a:spcPts val="0"/>
+              </a:spcAft>
+              <a:buNone/>
+              <a:tabLst/>
+              <a:defRPr sz="1800" b="0" i="0" u="none" strike="noStrike" kern="0" cap="none" spc="0" baseline="0">
+                <a:solidFill>
+                  <a:srgbClr val="000000"/>
+                </a:solidFill>
+                <a:uFillTx/>
+              </a:defRPr>
+            </a:pPr>
+            <a:r>
+              <a:rPr lang="en-GB" sz="1200" b="0" i="0" u="none" strike="noStrike" kern="1200" cap="none" spc="0" baseline="0">
+                <a:solidFill>
+                  <a:srgbClr val="000000"/>
+                </a:solidFill>
+                <a:uFillTx/>
+                <a:latin typeface="Calibri" pitchFamily="18"/>
+                <a:ea typeface="Microsoft YaHei" pitchFamily="2"/>
+                <a:cs typeface="Lucida Sans" pitchFamily="2"/>
+              </a:rPr>
+              <a:t>PK</a:t>
+            </a:r>
+          </a:p>
+        </p:txBody>
+      </p:sp>
+      <p:sp>
+        <p:nvSpPr>
+          <p:cNvPr id="23" name="TextBox 22">
+            <a:extLst>
+              <a:ext uri="{FF2B5EF4-FFF2-40B4-BE49-F238E27FC236}">
+                <a16:creationId xmlns:a16="http://schemas.microsoft.com/office/drawing/2014/main" id="{2245894A-8B3D-4411-9F3C-6A23F4CAE365}"/>
+              </a:ext>
+            </a:extLst>
+          </p:cNvPr>
+          <p:cNvSpPr txBox="1"/>
+          <p:nvPr/>
+        </p:nvSpPr>
+        <p:spPr>
+          <a:xfrm>
+            <a:off x="8118826" y="3137140"/>
+            <a:ext cx="344884" cy="276843"/>
+          </a:xfrm>
+          <a:prstGeom prst="rect">
+            <a:avLst/>
+          </a:prstGeom>
+          <a:noFill/>
+          <a:ln cap="flat">
+            <a:noFill/>
+          </a:ln>
+        </p:spPr>
+        <p:txBody>
+          <a:bodyPr vert="horz" wrap="none" lIns="91440" tIns="45720" rIns="91440" bIns="45720" anchor="t" anchorCtr="0" compatLnSpc="0">
+            <a:spAutoFit/>
+          </a:bodyPr>
+          <a:lstStyle/>
+          <a:p>
+            <a:pPr marL="0" marR="0" lvl="0" indent="0" algn="l" defTabSz="914400" rtl="0" fontAlgn="auto" hangingPunct="1">
+              <a:lnSpc>
+                <a:spcPct val="100000"/>
+              </a:lnSpc>
+              <a:spcBef>
+                <a:spcPts val="0"/>
+              </a:spcBef>
+              <a:spcAft>
+                <a:spcPts val="0"/>
+              </a:spcAft>
+              <a:buNone/>
+              <a:tabLst/>
+              <a:defRPr sz="1800" b="0" i="0" u="none" strike="noStrike" kern="0" cap="none" spc="0" baseline="0">
+                <a:solidFill>
+                  <a:srgbClr val="000000"/>
+                </a:solidFill>
+                <a:uFillTx/>
+              </a:defRPr>
+            </a:pPr>
+            <a:r>
+              <a:rPr lang="en-GB" sz="1200" b="0" i="0" u="none" strike="noStrike" kern="1200" cap="none" spc="0" baseline="0">
+                <a:solidFill>
+                  <a:srgbClr val="000000"/>
+                </a:solidFill>
+                <a:uFillTx/>
+                <a:latin typeface="Calibri" pitchFamily="18"/>
+                <a:ea typeface="Microsoft YaHei" pitchFamily="2"/>
+                <a:cs typeface="Lucida Sans" pitchFamily="2"/>
+              </a:rPr>
+              <a:t>PK</a:t>
+            </a:r>
+          </a:p>
+        </p:txBody>
+      </p:sp>
+      <p:sp>
+        <p:nvSpPr>
+          <p:cNvPr id="27" name="Rectangle 12">
+            <a:extLst>
+              <a:ext uri="{FF2B5EF4-FFF2-40B4-BE49-F238E27FC236}">
+                <a16:creationId xmlns:a16="http://schemas.microsoft.com/office/drawing/2014/main" id="{987677EE-72B4-496A-9DE9-2A13D596E9BC}"/>
+              </a:ext>
+            </a:extLst>
+          </p:cNvPr>
+          <p:cNvSpPr/>
+          <p:nvPr/>
+        </p:nvSpPr>
+        <p:spPr>
+          <a:xfrm>
+            <a:off x="6808574" y="1064069"/>
+            <a:ext cx="1578574" cy="1344570"/>
+          </a:xfrm>
+          <a:prstGeom prst="rect">
+            <a:avLst/>
+          </a:prstGeom>
+          <a:solidFill>
+            <a:srgbClr val="FFFFFF"/>
+          </a:solidFill>
+          <a:ln w="12600" cap="flat">
+            <a:solidFill>
+              <a:srgbClr val="000000"/>
+            </a:solidFill>
+            <a:prstDash val="solid"/>
+            <a:miter/>
+          </a:ln>
+        </p:spPr>
+        <p:txBody>
+          <a:bodyPr vert="horz" wrap="square" lIns="91440" tIns="45720" rIns="91440" bIns="45720" anchor="ctr" anchorCtr="1" compatLnSpc="0">
+            <a:noAutofit/>
+          </a:bodyPr>
+          <a:lstStyle/>
+          <a:p>
+            <a:pPr marL="0" marR="0" lvl="0" indent="0" algn="l" defTabSz="914400" rtl="0" fontAlgn="auto" hangingPunct="0">
+              <a:lnSpc>
+                <a:spcPct val="100000"/>
+              </a:lnSpc>
+              <a:spcBef>
+                <a:spcPts val="0"/>
+              </a:spcBef>
+              <a:spcAft>
+                <a:spcPts val="0"/>
+              </a:spcAft>
+              <a:buNone/>
+              <a:tabLst/>
+              <a:defRPr sz="1800" b="0" i="0" u="none" strike="noStrike" kern="0" cap="none" spc="0" baseline="0">
+                <a:solidFill>
+                  <a:srgbClr val="000000"/>
+                </a:solidFill>
+                <a:uFillTx/>
+              </a:defRPr>
+            </a:pPr>
+            <a:endParaRPr lang="en-GB" sz="1800" b="0" i="0" u="none" strike="noStrike" kern="1200" cap="none" spc="0" baseline="0">
+              <a:solidFill>
+                <a:srgbClr val="000000"/>
+              </a:solidFill>
+              <a:uFillTx/>
+              <a:latin typeface="Arial" pitchFamily="18"/>
+              <a:ea typeface="Microsoft YaHei" pitchFamily="2"/>
+              <a:cs typeface="Lucida Sans" pitchFamily="2"/>
+            </a:endParaRPr>
+          </a:p>
+        </p:txBody>
+      </p:sp>
+      <p:sp>
+        <p:nvSpPr>
+          <p:cNvPr id="28" name="TextBox 13">
+            <a:extLst>
+              <a:ext uri="{FF2B5EF4-FFF2-40B4-BE49-F238E27FC236}">
+                <a16:creationId xmlns:a16="http://schemas.microsoft.com/office/drawing/2014/main" id="{4D3573ED-1D39-457C-9826-256EABEAF305}"/>
+              </a:ext>
+            </a:extLst>
+          </p:cNvPr>
+          <p:cNvSpPr txBox="1"/>
+          <p:nvPr/>
+        </p:nvSpPr>
+        <p:spPr>
+          <a:xfrm>
+            <a:off x="6808574" y="1064069"/>
+            <a:ext cx="1641668" cy="468077"/>
+          </a:xfrm>
+          <a:prstGeom prst="rect">
+            <a:avLst/>
+          </a:prstGeom>
+          <a:noFill/>
+          <a:ln cap="flat">
+            <a:noFill/>
+          </a:ln>
+        </p:spPr>
+        <p:txBody>
+          <a:bodyPr vert="horz" wrap="none" lIns="91440" tIns="45720" rIns="91440" bIns="45720" anchor="t" anchorCtr="0" compatLnSpc="0">
+            <a:spAutoFit/>
+          </a:bodyPr>
+          <a:lstStyle/>
+          <a:p>
+            <a:pPr marL="0" marR="0" lvl="0" indent="0" algn="l" defTabSz="914400" rtl="0" fontAlgn="auto" hangingPunct="1">
+              <a:lnSpc>
+                <a:spcPct val="100000"/>
+              </a:lnSpc>
+              <a:spcBef>
+                <a:spcPts val="0"/>
+              </a:spcBef>
+              <a:spcAft>
+                <a:spcPts val="0"/>
+              </a:spcAft>
+              <a:buNone/>
+              <a:tabLst/>
+              <a:defRPr sz="1800" b="0" i="0" u="none" strike="noStrike" kern="0" cap="none" spc="0" baseline="0">
+                <a:solidFill>
+                  <a:srgbClr val="000000"/>
+                </a:solidFill>
+                <a:uFillTx/>
+              </a:defRPr>
+            </a:pPr>
+            <a:r>
+              <a:rPr lang="en-GB" sz="1200" b="0" i="0" u="none" strike="noStrike" kern="0" cap="none" spc="0" baseline="0" dirty="0">
+                <a:solidFill>
+                  <a:srgbClr val="000000"/>
+                </a:solidFill>
+                <a:uFillTx/>
+                <a:latin typeface="Calibri" pitchFamily="18"/>
+                <a:ea typeface="Microsoft YaHei" pitchFamily="2"/>
+                <a:cs typeface="Lucida Sans" pitchFamily="2"/>
+              </a:rPr>
+              <a:t>date</a:t>
+            </a:r>
+            <a:r>
+              <a:rPr lang="en-GB" sz="1200" b="0" i="0" u="none" strike="noStrike" kern="1200" cap="none" spc="0" baseline="0" dirty="0">
+                <a:solidFill>
+                  <a:srgbClr val="000000"/>
+                </a:solidFill>
+                <a:uFillTx/>
+                <a:latin typeface="Calibri" pitchFamily="18"/>
+                <a:ea typeface="Microsoft YaHei" pitchFamily="2"/>
+                <a:cs typeface="Lucida Sans" pitchFamily="2"/>
+              </a:rPr>
+              <a:t> | time | room no. </a:t>
+            </a:r>
+          </a:p>
+          <a:p>
+            <a:pPr marL="0" marR="0" lvl="0" indent="0" algn="l" defTabSz="914400" rtl="0" fontAlgn="auto" hangingPunct="1">
+              <a:lnSpc>
+                <a:spcPct val="100000"/>
+              </a:lnSpc>
+              <a:spcBef>
+                <a:spcPts val="0"/>
+              </a:spcBef>
+              <a:spcAft>
+                <a:spcPts val="0"/>
+              </a:spcAft>
+              <a:buNone/>
+              <a:tabLst/>
+              <a:defRPr sz="1800" b="0" i="0" u="none" strike="noStrike" kern="0" cap="none" spc="0" baseline="0">
+                <a:solidFill>
+                  <a:srgbClr val="000000"/>
+                </a:solidFill>
+                <a:uFillTx/>
+              </a:defRPr>
+            </a:pPr>
+            <a:endParaRPr lang="en-GB" sz="1200" b="1" i="0" u="none" strike="noStrike" kern="1200" cap="none" spc="0" baseline="0" dirty="0">
+              <a:solidFill>
+                <a:srgbClr val="000000"/>
+              </a:solidFill>
+              <a:uFillTx/>
+              <a:latin typeface="Calibri" pitchFamily="18"/>
+              <a:ea typeface="Microsoft YaHei" pitchFamily="2"/>
+              <a:cs typeface="Lucida Sans" pitchFamily="2"/>
+            </a:endParaRPr>
+          </a:p>
+        </p:txBody>
+      </p:sp>
+      <p:cxnSp>
+        <p:nvCxnSpPr>
+          <p:cNvPr id="29" name="Straight Connector 14">
+            <a:extLst>
+              <a:ext uri="{FF2B5EF4-FFF2-40B4-BE49-F238E27FC236}">
+                <a16:creationId xmlns:a16="http://schemas.microsoft.com/office/drawing/2014/main" id="{4C8BBDA6-03DD-459D-8C43-9E47231628C2}"/>
+              </a:ext>
+            </a:extLst>
+          </p:cNvPr>
+          <p:cNvCxnSpPr/>
+          <p:nvPr/>
+        </p:nvCxnSpPr>
+        <p:spPr>
+          <a:xfrm>
+            <a:off x="6808574" y="1341269"/>
+            <a:ext cx="0" cy="336234"/>
+          </a:xfrm>
+          <a:prstGeom prst="straightConnector1">
+            <a:avLst/>
+          </a:prstGeom>
+          <a:noFill/>
+          <a:ln w="6483" cap="flat">
+            <a:solidFill>
+              <a:srgbClr val="000000"/>
+            </a:solidFill>
+            <a:prstDash val="solid"/>
+            <a:miter/>
+          </a:ln>
+        </p:spPr>
+      </p:cxnSp>
+      <p:sp>
+        <p:nvSpPr>
+          <p:cNvPr id="30" name="TextBox 22">
+            <a:extLst>
+              <a:ext uri="{FF2B5EF4-FFF2-40B4-BE49-F238E27FC236}">
+                <a16:creationId xmlns:a16="http://schemas.microsoft.com/office/drawing/2014/main" id="{43E64407-4C55-489D-8ED8-999623008DB6}"/>
+              </a:ext>
+            </a:extLst>
+          </p:cNvPr>
+          <p:cNvSpPr txBox="1"/>
+          <p:nvPr/>
+        </p:nvSpPr>
+        <p:spPr>
+          <a:xfrm>
+            <a:off x="7901625" y="785506"/>
+            <a:ext cx="344884" cy="276843"/>
+          </a:xfrm>
+          <a:prstGeom prst="rect">
+            <a:avLst/>
+          </a:prstGeom>
+          <a:noFill/>
+          <a:ln cap="flat">
+            <a:noFill/>
+          </a:ln>
+        </p:spPr>
+        <p:txBody>
+          <a:bodyPr vert="horz" wrap="none" lIns="91440" tIns="45720" rIns="91440" bIns="45720" anchor="t" anchorCtr="0" compatLnSpc="0">
+            <a:spAutoFit/>
+          </a:bodyPr>
+          <a:lstStyle/>
+          <a:p>
+            <a:pPr marL="0" marR="0" lvl="0" indent="0" algn="l" defTabSz="914400" rtl="0" fontAlgn="auto" hangingPunct="1">
+              <a:lnSpc>
+                <a:spcPct val="100000"/>
+              </a:lnSpc>
+              <a:spcBef>
+                <a:spcPts val="0"/>
+              </a:spcBef>
+              <a:spcAft>
+                <a:spcPts val="0"/>
+              </a:spcAft>
+              <a:buNone/>
+              <a:tabLst/>
+              <a:defRPr sz="1800" b="0" i="0" u="none" strike="noStrike" kern="0" cap="none" spc="0" baseline="0">
+                <a:solidFill>
+                  <a:srgbClr val="000000"/>
+                </a:solidFill>
+                <a:uFillTx/>
+              </a:defRPr>
+            </a:pPr>
+            <a:r>
+              <a:rPr lang="en-GB" sz="1200" b="0" i="0" u="none" strike="noStrike" kern="1200" cap="none" spc="0" baseline="0">
+                <a:solidFill>
+                  <a:srgbClr val="000000"/>
+                </a:solidFill>
+                <a:uFillTx/>
+                <a:latin typeface="Calibri" pitchFamily="18"/>
+                <a:ea typeface="Microsoft YaHei" pitchFamily="2"/>
+                <a:cs typeface="Lucida Sans" pitchFamily="2"/>
+              </a:rPr>
+              <a:t>PK</a:t>
+            </a:r>
+          </a:p>
+        </p:txBody>
+      </p:sp>
+      <p:sp>
+        <p:nvSpPr>
+          <p:cNvPr id="31" name="TextBox 25">
+            <a:extLst>
+              <a:ext uri="{FF2B5EF4-FFF2-40B4-BE49-F238E27FC236}">
+                <a16:creationId xmlns:a16="http://schemas.microsoft.com/office/drawing/2014/main" id="{AFB4F895-40E0-4BDA-BEAE-07AFCC5BD2CC}"/>
+              </a:ext>
+            </a:extLst>
+          </p:cNvPr>
+          <p:cNvSpPr txBox="1"/>
+          <p:nvPr/>
+        </p:nvSpPr>
+        <p:spPr>
+          <a:xfrm>
+            <a:off x="7137913" y="2422589"/>
+            <a:ext cx="1867242" cy="468077"/>
+          </a:xfrm>
+          <a:prstGeom prst="rect">
+            <a:avLst/>
+          </a:prstGeom>
+          <a:noFill/>
+          <a:ln cap="flat">
+            <a:noFill/>
+          </a:ln>
+        </p:spPr>
+        <p:txBody>
+          <a:bodyPr vert="horz" wrap="none" lIns="91440" tIns="45720" rIns="91440" bIns="45720" anchor="t" anchorCtr="0" compatLnSpc="0">
+            <a:spAutoFit/>
+          </a:bodyPr>
+          <a:lstStyle/>
+          <a:p>
+            <a:pPr marL="0" marR="0" lvl="0" indent="0" algn="l" defTabSz="914400" rtl="0" fontAlgn="auto" hangingPunct="1">
+              <a:lnSpc>
+                <a:spcPct val="100000"/>
+              </a:lnSpc>
+              <a:spcBef>
+                <a:spcPts val="0"/>
+              </a:spcBef>
+              <a:spcAft>
+                <a:spcPts val="0"/>
+              </a:spcAft>
+              <a:buNone/>
+              <a:tabLst/>
+              <a:defRPr sz="1800" b="0" i="0" u="none" strike="noStrike" kern="0" cap="none" spc="0" baseline="0">
+                <a:solidFill>
+                  <a:srgbClr val="000000"/>
+                </a:solidFill>
+                <a:uFillTx/>
+              </a:defRPr>
+            </a:pPr>
+            <a:r>
+              <a:rPr lang="en-GB" sz="1200" kern="0" dirty="0">
+                <a:solidFill>
+                  <a:srgbClr val="000000"/>
+                </a:solidFill>
+                <a:latin typeface="Calibri" pitchFamily="18"/>
+                <a:ea typeface="Microsoft YaHei" pitchFamily="2"/>
+                <a:cs typeface="Lucida Sans" pitchFamily="2"/>
+              </a:rPr>
+              <a:t>FREE ROOM</a:t>
+            </a:r>
+            <a:r>
+              <a:rPr lang="en-GB" sz="1200" b="0" i="0" u="none" strike="noStrike" kern="1200" cap="none" spc="0" baseline="0" dirty="0">
+                <a:solidFill>
+                  <a:srgbClr val="000000"/>
+                </a:solidFill>
+                <a:uFillTx/>
+                <a:latin typeface="Calibri" pitchFamily="18"/>
+                <a:ea typeface="Microsoft YaHei" pitchFamily="2"/>
+                <a:cs typeface="Lucida Sans" pitchFamily="2"/>
+              </a:rPr>
+              <a:t> TABLE</a:t>
+            </a:r>
+          </a:p>
+          <a:p>
+            <a:pPr marL="0" marR="0" lvl="0" indent="0" algn="l" defTabSz="914400" rtl="0" fontAlgn="auto" hangingPunct="1">
+              <a:lnSpc>
+                <a:spcPct val="100000"/>
+              </a:lnSpc>
+              <a:spcBef>
+                <a:spcPts val="0"/>
+              </a:spcBef>
+              <a:spcAft>
+                <a:spcPts val="0"/>
+              </a:spcAft>
+              <a:buNone/>
+              <a:tabLst/>
+              <a:defRPr sz="1800" b="0" i="0" u="none" strike="noStrike" kern="0" cap="none" spc="0" baseline="0">
+                <a:solidFill>
+                  <a:srgbClr val="000000"/>
+                </a:solidFill>
+                <a:uFillTx/>
+              </a:defRPr>
+            </a:pPr>
+            <a:r>
+              <a:rPr lang="en-GB" sz="1200" dirty="0" err="1">
+                <a:solidFill>
+                  <a:srgbClr val="FF0000"/>
+                </a:solidFill>
+                <a:latin typeface="Calibri" pitchFamily="18"/>
+                <a:ea typeface="Microsoft YaHei" pitchFamily="2"/>
+                <a:cs typeface="Lucida Sans" pitchFamily="2"/>
+              </a:rPr>
+              <a:t>timetable_data</a:t>
+            </a:r>
+            <a:r>
+              <a:rPr lang="en-GB" sz="1200" dirty="0">
+                <a:solidFill>
+                  <a:srgbClr val="FF0000"/>
+                </a:solidFill>
+                <a:latin typeface="Calibri" pitchFamily="18"/>
+                <a:ea typeface="Microsoft YaHei" pitchFamily="2"/>
+                <a:cs typeface="Lucida Sans" pitchFamily="2"/>
+              </a:rPr>
+              <a:t> in old code</a:t>
+            </a:r>
+            <a:endParaRPr lang="en-GB" sz="1200" b="0" i="0" u="none" strike="noStrike" kern="1200" cap="none" spc="0" baseline="0" dirty="0">
+              <a:solidFill>
+                <a:srgbClr val="FF0000"/>
+              </a:solidFill>
+              <a:uFillTx/>
+              <a:latin typeface="Calibri" pitchFamily="18"/>
+              <a:ea typeface="Microsoft YaHei" pitchFamily="2"/>
+              <a:cs typeface="Lucida Sans" pitchFamily="2"/>
+            </a:endParaRPr>
+          </a:p>
+        </p:txBody>
+      </p:sp>
+      <p:sp>
+        <p:nvSpPr>
+          <p:cNvPr id="32" name="Oval 32">
+            <a:extLst>
+              <a:ext uri="{FF2B5EF4-FFF2-40B4-BE49-F238E27FC236}">
+                <a16:creationId xmlns:a16="http://schemas.microsoft.com/office/drawing/2014/main" id="{B6C161EF-BC43-4420-98FE-1F88C6C61885}"/>
+              </a:ext>
+            </a:extLst>
+          </p:cNvPr>
+          <p:cNvSpPr/>
+          <p:nvPr/>
+        </p:nvSpPr>
+        <p:spPr>
+          <a:xfrm>
+            <a:off x="6627607" y="1679113"/>
+            <a:ext cx="96844" cy="114482"/>
+          </a:xfrm>
+          <a:custGeom>
+            <a:avLst/>
+            <a:gdLst>
+              <a:gd name="f0" fmla="val 21600000"/>
+              <a:gd name="f1" fmla="val 10800000"/>
+              <a:gd name="f2" fmla="val 5400000"/>
+              <a:gd name="f3" fmla="val 180"/>
+              <a:gd name="f4" fmla="val w"/>
+              <a:gd name="f5" fmla="val h"/>
+              <a:gd name="f6" fmla="val ss"/>
+              <a:gd name="f7" fmla="val 0"/>
+              <a:gd name="f8" fmla="*/ 5419351 1 1725033"/>
+              <a:gd name="f9" fmla="+- 0 0 0"/>
+              <a:gd name="f10" fmla="abs f4"/>
+              <a:gd name="f11" fmla="abs f5"/>
+              <a:gd name="f12" fmla="abs f6"/>
+              <a:gd name="f13" fmla="+- 2700000 f2 0"/>
+              <a:gd name="f14" fmla="*/ f9 f1 1"/>
+              <a:gd name="f15" fmla="?: f10 f4 1"/>
+              <a:gd name="f16" fmla="?: f11 f5 1"/>
+              <a:gd name="f17" fmla="?: f12 f6 1"/>
+              <a:gd name="f18" fmla="+- f13 0 f2"/>
+              <a:gd name="f19" fmla="*/ f14 1 f3"/>
+              <a:gd name="f20" fmla="*/ f15 1 21600"/>
+              <a:gd name="f21" fmla="*/ f16 1 21600"/>
+              <a:gd name="f22" fmla="*/ 21600 f15 1"/>
+              <a:gd name="f23" fmla="*/ 21600 f16 1"/>
+              <a:gd name="f24" fmla="+- f18 f2 0"/>
+              <a:gd name="f25" fmla="+- f19 0 f2"/>
+              <a:gd name="f26" fmla="min f21 f20"/>
+              <a:gd name="f27" fmla="*/ f22 1 f17"/>
+              <a:gd name="f28" fmla="*/ f23 1 f17"/>
+              <a:gd name="f29" fmla="*/ f24 f8 1"/>
+              <a:gd name="f30" fmla="val f27"/>
+              <a:gd name="f31" fmla="val f28"/>
+              <a:gd name="f32" fmla="*/ f29 1 f1"/>
+              <a:gd name="f33" fmla="*/ f7 f26 1"/>
+              <a:gd name="f34" fmla="+- f31 0 f7"/>
+              <a:gd name="f35" fmla="+- f30 0 f7"/>
+              <a:gd name="f36" fmla="+- 0 0 f32"/>
+              <a:gd name="f37" fmla="*/ f34 1 2"/>
+              <a:gd name="f38" fmla="*/ f35 1 2"/>
+              <a:gd name="f39" fmla="+- 0 0 f36"/>
+              <a:gd name="f40" fmla="+- f7 f37 0"/>
+              <a:gd name="f41" fmla="+- f7 f38 0"/>
+              <a:gd name="f42" fmla="*/ f39 f1 1"/>
+              <a:gd name="f43" fmla="*/ f38 f26 1"/>
+              <a:gd name="f44" fmla="*/ f37 f26 1"/>
+              <a:gd name="f45" fmla="*/ f42 1 f8"/>
+              <a:gd name="f46" fmla="*/ f40 f26 1"/>
+              <a:gd name="f47" fmla="+- f45 0 f2"/>
+              <a:gd name="f48" fmla="cos 1 f47"/>
+              <a:gd name="f49" fmla="sin 1 f47"/>
+              <a:gd name="f50" fmla="+- 0 0 f48"/>
+              <a:gd name="f51" fmla="+- 0 0 f49"/>
+              <a:gd name="f52" fmla="+- 0 0 f50"/>
+              <a:gd name="f53" fmla="+- 0 0 f51"/>
+              <a:gd name="f54" fmla="val f52"/>
+              <a:gd name="f55" fmla="val f53"/>
+              <a:gd name="f56" fmla="*/ f54 f38 1"/>
+              <a:gd name="f57" fmla="*/ f55 f37 1"/>
+              <a:gd name="f58" fmla="+- f41 0 f56"/>
+              <a:gd name="f59" fmla="+- f41 f56 0"/>
+              <a:gd name="f60" fmla="+- f40 0 f57"/>
+              <a:gd name="f61" fmla="+- f40 f57 0"/>
+              <a:gd name="f62" fmla="*/ f58 f26 1"/>
+              <a:gd name="f63" fmla="*/ f60 f26 1"/>
+              <a:gd name="f64" fmla="*/ f59 f26 1"/>
+              <a:gd name="f65" fmla="*/ f61 f26 1"/>
+            </a:gdLst>
+            <a:ahLst/>
+            <a:cxnLst>
+              <a:cxn ang="3cd4">
+                <a:pos x="hc" y="t"/>
+              </a:cxn>
+              <a:cxn ang="0">
+                <a:pos x="r" y="vc"/>
+              </a:cxn>
+              <a:cxn ang="cd4">
+                <a:pos x="hc" y="b"/>
+              </a:cxn>
+              <a:cxn ang="cd2">
+                <a:pos x="l" y="vc"/>
+              </a:cxn>
+              <a:cxn ang="f25">
+                <a:pos x="f62" y="f63"/>
+              </a:cxn>
+              <a:cxn ang="f25">
+                <a:pos x="f62" y="f65"/>
+              </a:cxn>
+              <a:cxn ang="f25">
+                <a:pos x="f64" y="f65"/>
+              </a:cxn>
+              <a:cxn ang="f25">
+                <a:pos x="f64" y="f63"/>
+              </a:cxn>
+            </a:cxnLst>
+            <a:rect l="f62" t="f63" r="f64" b="f65"/>
+            <a:pathLst>
+              <a:path>
+                <a:moveTo>
+                  <a:pt x="f33" y="f46"/>
+                </a:moveTo>
+                <a:arcTo wR="f43" hR="f44" stAng="f1" swAng="f0"/>
+                <a:close/>
+              </a:path>
+            </a:pathLst>
+          </a:custGeom>
+          <a:solidFill>
+            <a:srgbClr val="FFFFFF"/>
+          </a:solidFill>
+          <a:ln w="12600" cap="flat">
+            <a:solidFill>
+              <a:srgbClr val="000000"/>
+            </a:solidFill>
+            <a:prstDash val="solid"/>
+            <a:miter/>
+          </a:ln>
+        </p:spPr>
+        <p:txBody>
+          <a:bodyPr vert="horz" wrap="square" lIns="91440" tIns="45720" rIns="91440" bIns="45720" anchor="ctr" anchorCtr="1" compatLnSpc="0">
+            <a:noAutofit/>
+          </a:bodyPr>
+          <a:lstStyle/>
+          <a:p>
+            <a:pPr marL="0" marR="0" lvl="0" indent="0" algn="l" defTabSz="914400" rtl="0" fontAlgn="auto" hangingPunct="0">
+              <a:lnSpc>
+                <a:spcPct val="100000"/>
+              </a:lnSpc>
+              <a:spcBef>
+                <a:spcPts val="0"/>
+              </a:spcBef>
+              <a:spcAft>
+                <a:spcPts val="0"/>
+              </a:spcAft>
+              <a:buNone/>
+              <a:tabLst/>
+              <a:defRPr sz="1800" b="0" i="0" u="none" strike="noStrike" kern="0" cap="none" spc="0" baseline="0">
+                <a:solidFill>
+                  <a:srgbClr val="000000"/>
+                </a:solidFill>
+                <a:uFillTx/>
+              </a:defRPr>
+            </a:pPr>
+            <a:endParaRPr lang="en-GB" sz="1800" b="0" i="0" u="none" strike="noStrike" kern="1200" cap="none" spc="0" baseline="0">
+              <a:solidFill>
+                <a:srgbClr val="000000"/>
+              </a:solidFill>
+              <a:uFillTx/>
+              <a:latin typeface="Arial" pitchFamily="18"/>
+              <a:ea typeface="Microsoft YaHei" pitchFamily="2"/>
+              <a:cs typeface="Lucida Sans" pitchFamily="2"/>
+            </a:endParaRPr>
+          </a:p>
+        </p:txBody>
+      </p:sp>
+      <p:cxnSp>
+        <p:nvCxnSpPr>
+          <p:cNvPr id="33" name="Straight Connector 10">
+            <a:extLst>
+              <a:ext uri="{FF2B5EF4-FFF2-40B4-BE49-F238E27FC236}">
+                <a16:creationId xmlns:a16="http://schemas.microsoft.com/office/drawing/2014/main" id="{84696FD1-D949-48B0-9C0C-A44C6BEC56BE}"/>
+              </a:ext>
+            </a:extLst>
+          </p:cNvPr>
+          <p:cNvCxnSpPr>
+            <a:cxnSpLocks/>
+          </p:cNvCxnSpPr>
+          <p:nvPr/>
+        </p:nvCxnSpPr>
+        <p:spPr>
+          <a:xfrm>
+            <a:off x="6863292" y="1343061"/>
+            <a:ext cx="1523856" cy="0"/>
+          </a:xfrm>
+          <a:prstGeom prst="straightConnector1">
+            <a:avLst/>
+          </a:prstGeom>
+          <a:noFill/>
+          <a:ln w="6483" cap="flat">
+            <a:solidFill>
+              <a:srgbClr val="000000"/>
+            </a:solidFill>
+            <a:prstDash val="solid"/>
+            <a:miter/>
+          </a:ln>
+        </p:spPr>
+      </p:cxnSp>
+      <p:sp>
+        <p:nvSpPr>
+          <p:cNvPr id="34" name="TextBox 22">
+            <a:extLst>
+              <a:ext uri="{FF2B5EF4-FFF2-40B4-BE49-F238E27FC236}">
+                <a16:creationId xmlns:a16="http://schemas.microsoft.com/office/drawing/2014/main" id="{B637DC94-E375-4046-BD97-5AB2DE88D852}"/>
+              </a:ext>
+            </a:extLst>
+          </p:cNvPr>
+          <p:cNvSpPr txBox="1"/>
+          <p:nvPr/>
+        </p:nvSpPr>
+        <p:spPr>
+          <a:xfrm>
+            <a:off x="6965471" y="770802"/>
+            <a:ext cx="344884" cy="276843"/>
+          </a:xfrm>
+          <a:prstGeom prst="rect">
+            <a:avLst/>
+          </a:prstGeom>
+          <a:noFill/>
+          <a:ln cap="flat">
+            <a:noFill/>
+          </a:ln>
+        </p:spPr>
+        <p:txBody>
+          <a:bodyPr vert="horz" wrap="none" lIns="91440" tIns="45720" rIns="91440" bIns="45720" anchor="t" anchorCtr="0" compatLnSpc="0">
+            <a:spAutoFit/>
+          </a:bodyPr>
+          <a:lstStyle/>
+          <a:p>
+            <a:pPr marL="0" marR="0" lvl="0" indent="0" algn="l" defTabSz="914400" rtl="0" fontAlgn="auto" hangingPunct="1">
+              <a:lnSpc>
+                <a:spcPct val="100000"/>
+              </a:lnSpc>
+              <a:spcBef>
+                <a:spcPts val="0"/>
+              </a:spcBef>
+              <a:spcAft>
+                <a:spcPts val="0"/>
+              </a:spcAft>
+              <a:buNone/>
+              <a:tabLst/>
+              <a:defRPr sz="1800" b="0" i="0" u="none" strike="noStrike" kern="0" cap="none" spc="0" baseline="0">
+                <a:solidFill>
+                  <a:srgbClr val="000000"/>
+                </a:solidFill>
+                <a:uFillTx/>
+              </a:defRPr>
+            </a:pPr>
+            <a:r>
+              <a:rPr lang="en-GB" sz="1200" b="0" i="0" u="none" strike="noStrike" kern="1200" cap="none" spc="0" baseline="0">
+                <a:solidFill>
+                  <a:srgbClr val="000000"/>
+                </a:solidFill>
+                <a:uFillTx/>
+                <a:latin typeface="Calibri" pitchFamily="18"/>
+                <a:ea typeface="Microsoft YaHei" pitchFamily="2"/>
+                <a:cs typeface="Lucida Sans" pitchFamily="2"/>
+              </a:rPr>
+              <a:t>PK</a:t>
+            </a:r>
+          </a:p>
+        </p:txBody>
+      </p:sp>
+      <p:sp>
+        <p:nvSpPr>
+          <p:cNvPr id="35" name="TextBox 34">
+            <a:extLst>
+              <a:ext uri="{FF2B5EF4-FFF2-40B4-BE49-F238E27FC236}">
+                <a16:creationId xmlns:a16="http://schemas.microsoft.com/office/drawing/2014/main" id="{547FE808-4DD2-4ACB-A509-203A334A7F0C}"/>
+              </a:ext>
+            </a:extLst>
+          </p:cNvPr>
+          <p:cNvSpPr txBox="1"/>
+          <p:nvPr/>
+        </p:nvSpPr>
+        <p:spPr>
+          <a:xfrm>
+            <a:off x="7369536" y="784216"/>
+            <a:ext cx="344884" cy="276843"/>
+          </a:xfrm>
+          <a:prstGeom prst="rect">
+            <a:avLst/>
+          </a:prstGeom>
+          <a:noFill/>
+          <a:ln cap="flat">
+            <a:noFill/>
+          </a:ln>
+        </p:spPr>
+        <p:txBody>
+          <a:bodyPr vert="horz" wrap="none" lIns="91440" tIns="45720" rIns="91440" bIns="45720" anchor="t" anchorCtr="0" compatLnSpc="0">
+            <a:spAutoFit/>
+          </a:bodyPr>
+          <a:lstStyle/>
+          <a:p>
+            <a:pPr marL="0" marR="0" lvl="0" indent="0" algn="l" defTabSz="914400" rtl="0" fontAlgn="auto" hangingPunct="1">
+              <a:lnSpc>
+                <a:spcPct val="100000"/>
+              </a:lnSpc>
+              <a:spcBef>
+                <a:spcPts val="0"/>
+              </a:spcBef>
+              <a:spcAft>
+                <a:spcPts val="0"/>
+              </a:spcAft>
+              <a:buNone/>
+              <a:tabLst/>
+              <a:defRPr sz="1800" b="0" i="0" u="none" strike="noStrike" kern="0" cap="none" spc="0" baseline="0">
+                <a:solidFill>
+                  <a:srgbClr val="000000"/>
+                </a:solidFill>
+                <a:uFillTx/>
+              </a:defRPr>
+            </a:pPr>
+            <a:r>
+              <a:rPr lang="en-GB" sz="1200" b="0" i="0" u="none" strike="noStrike" kern="1200" cap="none" spc="0" baseline="0">
+                <a:solidFill>
+                  <a:srgbClr val="000000"/>
+                </a:solidFill>
+                <a:uFillTx/>
+                <a:latin typeface="Calibri" pitchFamily="18"/>
+                <a:ea typeface="Microsoft YaHei" pitchFamily="2"/>
+                <a:cs typeface="Lucida Sans" pitchFamily="2"/>
+              </a:rPr>
+              <a:t>PK</a:t>
+            </a:r>
+          </a:p>
+        </p:txBody>
+      </p:sp>
+      <p:cxnSp>
+        <p:nvCxnSpPr>
+          <p:cNvPr id="38" name="Straight Connector 37">
+            <a:extLst>
+              <a:ext uri="{FF2B5EF4-FFF2-40B4-BE49-F238E27FC236}">
+                <a16:creationId xmlns:a16="http://schemas.microsoft.com/office/drawing/2014/main" id="{1F372B1C-D168-49EE-A8E8-6C63836640DB}"/>
+              </a:ext>
+            </a:extLst>
+          </p:cNvPr>
+          <p:cNvCxnSpPr>
+            <a:stCxn id="2" idx="3"/>
+            <a:endCxn id="27" idx="1"/>
+          </p:cNvCxnSpPr>
+          <p:nvPr/>
+        </p:nvCxnSpPr>
+        <p:spPr>
+          <a:xfrm>
+            <a:off x="5379396" y="1729436"/>
+            <a:ext cx="1429178" cy="6918"/>
+          </a:xfrm>
+          <a:prstGeom prst="line">
+            <a:avLst/>
+          </a:prstGeom>
+        </p:spPr>
+        <p:style>
+          <a:lnRef idx="1">
+            <a:schemeClr val="dk1"/>
+          </a:lnRef>
+          <a:fillRef idx="0">
+            <a:schemeClr val="dk1"/>
+          </a:fillRef>
+          <a:effectRef idx="0">
+            <a:schemeClr val="dk1"/>
+          </a:effectRef>
+          <a:fontRef idx="minor">
+            <a:schemeClr val="tx1"/>
+          </a:fontRef>
+        </p:style>
+      </p:cxnSp>
+      <p:cxnSp>
+        <p:nvCxnSpPr>
+          <p:cNvPr id="40" name="Connector: Elbow 39">
+            <a:extLst>
+              <a:ext uri="{FF2B5EF4-FFF2-40B4-BE49-F238E27FC236}">
+                <a16:creationId xmlns:a16="http://schemas.microsoft.com/office/drawing/2014/main" id="{C8BD52FB-79A9-446D-B920-DA02AF432037}"/>
+              </a:ext>
+            </a:extLst>
+          </p:cNvPr>
+          <p:cNvCxnSpPr>
+            <a:cxnSpLocks/>
+            <a:stCxn id="27" idx="3"/>
+            <a:endCxn id="9" idx="3"/>
+          </p:cNvCxnSpPr>
+          <p:nvPr/>
+        </p:nvCxnSpPr>
+        <p:spPr>
+          <a:xfrm>
+            <a:off x="8387148" y="1736354"/>
+            <a:ext cx="852631" cy="2273999"/>
+          </a:xfrm>
+          <a:prstGeom prst="bentConnector3">
+            <a:avLst>
+              <a:gd name="adj1" fmla="val 126811"/>
+            </a:avLst>
+          </a:prstGeom>
+        </p:spPr>
+        <p:style>
+          <a:lnRef idx="1">
+            <a:schemeClr val="dk1"/>
+          </a:lnRef>
+          <a:fillRef idx="0">
+            <a:schemeClr val="dk1"/>
+          </a:fillRef>
+          <a:effectRef idx="0">
+            <a:schemeClr val="dk1"/>
+          </a:effectRef>
+          <a:fontRef idx="minor">
+            <a:schemeClr val="tx1"/>
+          </a:fontRef>
+        </p:style>
+      </p:cxnSp>
+      <p:sp>
+        <p:nvSpPr>
+          <p:cNvPr id="44" name="Oval 32">
+            <a:extLst>
+              <a:ext uri="{FF2B5EF4-FFF2-40B4-BE49-F238E27FC236}">
+                <a16:creationId xmlns:a16="http://schemas.microsoft.com/office/drawing/2014/main" id="{CD66BA65-D681-4BAF-A655-E707C86DA3D7}"/>
+              </a:ext>
+            </a:extLst>
+          </p:cNvPr>
+          <p:cNvSpPr/>
+          <p:nvPr/>
+        </p:nvSpPr>
+        <p:spPr>
+          <a:xfrm>
+            <a:off x="8471693" y="1675654"/>
+            <a:ext cx="96844" cy="114482"/>
+          </a:xfrm>
+          <a:custGeom>
+            <a:avLst/>
+            <a:gdLst>
+              <a:gd name="f0" fmla="val 21600000"/>
+              <a:gd name="f1" fmla="val 10800000"/>
+              <a:gd name="f2" fmla="val 5400000"/>
+              <a:gd name="f3" fmla="val 180"/>
+              <a:gd name="f4" fmla="val w"/>
+              <a:gd name="f5" fmla="val h"/>
+              <a:gd name="f6" fmla="val ss"/>
+              <a:gd name="f7" fmla="val 0"/>
+              <a:gd name="f8" fmla="*/ 5419351 1 1725033"/>
+              <a:gd name="f9" fmla="+- 0 0 0"/>
+              <a:gd name="f10" fmla="abs f4"/>
+              <a:gd name="f11" fmla="abs f5"/>
+              <a:gd name="f12" fmla="abs f6"/>
+              <a:gd name="f13" fmla="+- 2700000 f2 0"/>
+              <a:gd name="f14" fmla="*/ f9 f1 1"/>
+              <a:gd name="f15" fmla="?: f10 f4 1"/>
+              <a:gd name="f16" fmla="?: f11 f5 1"/>
+              <a:gd name="f17" fmla="?: f12 f6 1"/>
+              <a:gd name="f18" fmla="+- f13 0 f2"/>
+              <a:gd name="f19" fmla="*/ f14 1 f3"/>
+              <a:gd name="f20" fmla="*/ f15 1 21600"/>
+              <a:gd name="f21" fmla="*/ f16 1 21600"/>
+              <a:gd name="f22" fmla="*/ 21600 f15 1"/>
+              <a:gd name="f23" fmla="*/ 21600 f16 1"/>
+              <a:gd name="f24" fmla="+- f18 f2 0"/>
+              <a:gd name="f25" fmla="+- f19 0 f2"/>
+              <a:gd name="f26" fmla="min f21 f20"/>
+              <a:gd name="f27" fmla="*/ f22 1 f17"/>
+              <a:gd name="f28" fmla="*/ f23 1 f17"/>
+              <a:gd name="f29" fmla="*/ f24 f8 1"/>
+              <a:gd name="f30" fmla="val f27"/>
+              <a:gd name="f31" fmla="val f28"/>
+              <a:gd name="f32" fmla="*/ f29 1 f1"/>
+              <a:gd name="f33" fmla="*/ f7 f26 1"/>
+              <a:gd name="f34" fmla="+- f31 0 f7"/>
+              <a:gd name="f35" fmla="+- f30 0 f7"/>
+              <a:gd name="f36" fmla="+- 0 0 f32"/>
+              <a:gd name="f37" fmla="*/ f34 1 2"/>
+              <a:gd name="f38" fmla="*/ f35 1 2"/>
+              <a:gd name="f39" fmla="+- 0 0 f36"/>
+              <a:gd name="f40" fmla="+- f7 f37 0"/>
+              <a:gd name="f41" fmla="+- f7 f38 0"/>
+              <a:gd name="f42" fmla="*/ f39 f1 1"/>
+              <a:gd name="f43" fmla="*/ f38 f26 1"/>
+              <a:gd name="f44" fmla="*/ f37 f26 1"/>
+              <a:gd name="f45" fmla="*/ f42 1 f8"/>
+              <a:gd name="f46" fmla="*/ f40 f26 1"/>
+              <a:gd name="f47" fmla="+- f45 0 f2"/>
+              <a:gd name="f48" fmla="cos 1 f47"/>
+              <a:gd name="f49" fmla="sin 1 f47"/>
+              <a:gd name="f50" fmla="+- 0 0 f48"/>
+              <a:gd name="f51" fmla="+- 0 0 f49"/>
+              <a:gd name="f52" fmla="+- 0 0 f50"/>
+              <a:gd name="f53" fmla="+- 0 0 f51"/>
+              <a:gd name="f54" fmla="val f52"/>
+              <a:gd name="f55" fmla="val f53"/>
+              <a:gd name="f56" fmla="*/ f54 f38 1"/>
+              <a:gd name="f57" fmla="*/ f55 f37 1"/>
+              <a:gd name="f58" fmla="+- f41 0 f56"/>
+              <a:gd name="f59" fmla="+- f41 f56 0"/>
+              <a:gd name="f60" fmla="+- f40 0 f57"/>
+              <a:gd name="f61" fmla="+- f40 f57 0"/>
+              <a:gd name="f62" fmla="*/ f58 f26 1"/>
+              <a:gd name="f63" fmla="*/ f60 f26 1"/>
+              <a:gd name="f64" fmla="*/ f59 f26 1"/>
+              <a:gd name="f65" fmla="*/ f61 f26 1"/>
+            </a:gdLst>
+            <a:ahLst/>
+            <a:cxnLst>
+              <a:cxn ang="3cd4">
+                <a:pos x="hc" y="t"/>
+              </a:cxn>
+              <a:cxn ang="0">
+                <a:pos x="r" y="vc"/>
+              </a:cxn>
+              <a:cxn ang="cd4">
+                <a:pos x="hc" y="b"/>
+              </a:cxn>
+              <a:cxn ang="cd2">
+                <a:pos x="l" y="vc"/>
+              </a:cxn>
+              <a:cxn ang="f25">
+                <a:pos x="f62" y="f63"/>
+              </a:cxn>
+              <a:cxn ang="f25">
+                <a:pos x="f62" y="f65"/>
+              </a:cxn>
+              <a:cxn ang="f25">
+                <a:pos x="f64" y="f65"/>
+              </a:cxn>
+              <a:cxn ang="f25">
+                <a:pos x="f64" y="f63"/>
+              </a:cxn>
+            </a:cxnLst>
+            <a:rect l="f62" t="f63" r="f64" b="f65"/>
+            <a:pathLst>
+              <a:path>
+                <a:moveTo>
+                  <a:pt x="f33" y="f46"/>
+                </a:moveTo>
+                <a:arcTo wR="f43" hR="f44" stAng="f1" swAng="f0"/>
+                <a:close/>
+              </a:path>
+            </a:pathLst>
+          </a:custGeom>
+          <a:solidFill>
+            <a:srgbClr val="FFFFFF"/>
+          </a:solidFill>
+          <a:ln w="12600" cap="flat">
+            <a:solidFill>
+              <a:srgbClr val="000000"/>
+            </a:solidFill>
+            <a:prstDash val="solid"/>
+            <a:miter/>
+          </a:ln>
+        </p:spPr>
+        <p:txBody>
+          <a:bodyPr vert="horz" wrap="square" lIns="91440" tIns="45720" rIns="91440" bIns="45720" anchor="ctr" anchorCtr="1" compatLnSpc="0">
+            <a:noAutofit/>
+          </a:bodyPr>
+          <a:lstStyle/>
+          <a:p>
+            <a:pPr marL="0" marR="0" lvl="0" indent="0" algn="l" defTabSz="914400" rtl="0" fontAlgn="auto" hangingPunct="0">
+              <a:lnSpc>
+                <a:spcPct val="100000"/>
+              </a:lnSpc>
+              <a:spcBef>
+                <a:spcPts val="0"/>
+              </a:spcBef>
+              <a:spcAft>
+                <a:spcPts val="0"/>
+              </a:spcAft>
+              <a:buNone/>
+              <a:tabLst/>
+              <a:defRPr sz="1800" b="0" i="0" u="none" strike="noStrike" kern="0" cap="none" spc="0" baseline="0">
+                <a:solidFill>
+                  <a:srgbClr val="000000"/>
+                </a:solidFill>
+                <a:uFillTx/>
+              </a:defRPr>
+            </a:pPr>
+            <a:endParaRPr lang="en-GB" sz="1800" b="0" i="0" u="none" strike="noStrike" kern="1200" cap="none" spc="0" baseline="0">
+              <a:solidFill>
+                <a:srgbClr val="000000"/>
+              </a:solidFill>
+              <a:uFillTx/>
+              <a:latin typeface="Arial" pitchFamily="18"/>
+              <a:ea typeface="Microsoft YaHei" pitchFamily="2"/>
+              <a:cs typeface="Lucida Sans" pitchFamily="2"/>
+            </a:endParaRPr>
+          </a:p>
+        </p:txBody>
+      </p:sp>
+      <p:sp>
+        <p:nvSpPr>
+          <p:cNvPr id="36" name="TextBox 23">
+            <a:extLst>
+              <a:ext uri="{FF2B5EF4-FFF2-40B4-BE49-F238E27FC236}">
+                <a16:creationId xmlns:a16="http://schemas.microsoft.com/office/drawing/2014/main" id="{219CB22A-67EB-49BC-ABAF-B214AC1AA012}"/>
+              </a:ext>
+            </a:extLst>
+          </p:cNvPr>
+          <p:cNvSpPr txBox="1"/>
+          <p:nvPr/>
+        </p:nvSpPr>
+        <p:spPr>
+          <a:xfrm>
+            <a:off x="1686614" y="1170701"/>
+            <a:ext cx="992451" cy="280205"/>
+          </a:xfrm>
+          <a:prstGeom prst="rect">
+            <a:avLst/>
+          </a:prstGeom>
+          <a:noFill/>
+          <a:ln cap="flat">
+            <a:noFill/>
+          </a:ln>
+        </p:spPr>
+        <p:txBody>
+          <a:bodyPr vert="horz" wrap="none" lIns="91440" tIns="45720" rIns="91440" bIns="45720" anchor="t" anchorCtr="0" compatLnSpc="0">
+            <a:spAutoFit/>
+          </a:bodyPr>
+          <a:lstStyle/>
+          <a:p>
+            <a:pPr marL="0" marR="0" lvl="0" indent="0" algn="l" defTabSz="914400" rtl="0" fontAlgn="auto" hangingPunct="1">
+              <a:lnSpc>
+                <a:spcPct val="100000"/>
+              </a:lnSpc>
+              <a:spcBef>
+                <a:spcPts val="0"/>
+              </a:spcBef>
+              <a:spcAft>
+                <a:spcPts val="0"/>
+              </a:spcAft>
+              <a:buNone/>
+              <a:tabLst/>
+              <a:defRPr sz="1800" b="0" i="0" u="none" strike="noStrike" kern="0" cap="none" spc="0" baseline="0">
+                <a:solidFill>
+                  <a:srgbClr val="000000"/>
+                </a:solidFill>
+                <a:uFillTx/>
+              </a:defRPr>
+            </a:pPr>
+            <a:r>
+              <a:rPr lang="en-GB" sz="1200" b="0" i="0" u="none" strike="noStrike" kern="1200" cap="none" spc="0" baseline="0" dirty="0">
+                <a:solidFill>
+                  <a:srgbClr val="FF0000"/>
+                </a:solidFill>
+                <a:uFillTx/>
+                <a:latin typeface="Calibri" pitchFamily="18"/>
+                <a:ea typeface="Microsoft YaHei" pitchFamily="2"/>
+                <a:cs typeface="Lucida Sans" pitchFamily="2"/>
+              </a:rPr>
+              <a:t>Lookup table</a:t>
+            </a:r>
+          </a:p>
+        </p:txBody>
+      </p:sp>
+      <p:sp>
+        <p:nvSpPr>
+          <p:cNvPr id="37" name="TextBox 23">
+            <a:extLst>
+              <a:ext uri="{FF2B5EF4-FFF2-40B4-BE49-F238E27FC236}">
+                <a16:creationId xmlns:a16="http://schemas.microsoft.com/office/drawing/2014/main" id="{1883C8E2-CC30-4D10-B5C1-C8501758FCF4}"/>
+              </a:ext>
+            </a:extLst>
+          </p:cNvPr>
+          <p:cNvSpPr txBox="1"/>
+          <p:nvPr/>
+        </p:nvSpPr>
+        <p:spPr>
+          <a:xfrm>
+            <a:off x="6777117" y="426491"/>
+            <a:ext cx="4065215" cy="280205"/>
+          </a:xfrm>
+          <a:prstGeom prst="rect">
+            <a:avLst/>
+          </a:prstGeom>
+          <a:noFill/>
+          <a:ln cap="flat">
+            <a:noFill/>
+          </a:ln>
+        </p:spPr>
+        <p:txBody>
+          <a:bodyPr vert="horz" wrap="none" lIns="91440" tIns="45720" rIns="91440" bIns="45720" anchor="t" anchorCtr="0" compatLnSpc="0">
+            <a:spAutoFit/>
+          </a:bodyPr>
+          <a:lstStyle/>
+          <a:p>
+            <a:pPr marL="0" marR="0" lvl="0" indent="0" algn="l" defTabSz="914400" rtl="0" fontAlgn="auto" hangingPunct="1">
+              <a:lnSpc>
+                <a:spcPct val="100000"/>
+              </a:lnSpc>
+              <a:spcBef>
+                <a:spcPts val="0"/>
+              </a:spcBef>
+              <a:spcAft>
+                <a:spcPts val="0"/>
+              </a:spcAft>
+              <a:buNone/>
+              <a:tabLst/>
+              <a:defRPr sz="1800" b="0" i="0" u="none" strike="noStrike" kern="0" cap="none" spc="0" baseline="0">
+                <a:solidFill>
+                  <a:srgbClr val="000000"/>
+                </a:solidFill>
+                <a:uFillTx/>
+              </a:defRPr>
+            </a:pPr>
+            <a:r>
+              <a:rPr lang="en-GB" sz="1200" b="0" i="0" u="none" strike="noStrike" kern="1200" cap="none" spc="0" baseline="0" dirty="0">
+                <a:solidFill>
+                  <a:srgbClr val="FF0000"/>
+                </a:solidFill>
+                <a:uFillTx/>
+                <a:latin typeface="Calibri" pitchFamily="18"/>
+                <a:ea typeface="Microsoft YaHei" pitchFamily="2"/>
+                <a:cs typeface="Lucida Sans" pitchFamily="2"/>
+              </a:rPr>
+              <a:t>Include which rooms are free assuming default is not available</a:t>
+            </a:r>
+          </a:p>
+        </p:txBody>
+      </p:sp>
+    </p:spTree>
+    <p:extLst>
+      <p:ext uri="{BB962C8B-B14F-4D97-AF65-F5344CB8AC3E}">
+        <p14:creationId xmlns:p14="http://schemas.microsoft.com/office/powerpoint/2010/main" val="3405425948"/>
+      </p:ext>
+    </p:extLst>
   </p:cSld>
   <p:clrMapOvr>
     <a:masterClrMapping/>

</xml_diff>